<commit_message>
Formatted Use Case Diagram to fit the Slide.
</commit_message>
<xml_diff>
--- a/docs/Team 8 Project Proposal.pptx
+++ b/docs/Team 8 Project Proposal.pptx
@@ -8,7 +8,7 @@
     <p:sldId id="256" r:id="rId2"/>
     <p:sldId id="257" r:id="rId3"/>
     <p:sldId id="258" r:id="rId4"/>
-    <p:sldId id="260" r:id="rId5"/>
+    <p:sldId id="267" r:id="rId5"/>
     <p:sldId id="266" r:id="rId6"/>
     <p:sldId id="264" r:id="rId7"/>
     <p:sldId id="261" r:id="rId8"/>
@@ -320,7 +320,8 @@
           <a:p>
             <a:fld id="{87B7D9A7-BEAE-440F-9607-82428B67954B}" type="datetimeFigureOut">
               <a:rPr lang="en-CA" smtClean="0"/>
-              <a:t>05/10/2010</a:t>
+              <a:pPr/>
+              <a:t>06/10/2010</a:t>
             </a:fld>
             <a:endParaRPr lang="en-CA" dirty="0"/>
           </a:p>
@@ -359,6 +360,7 @@
           <a:p>
             <a:fld id="{6D58B483-95C4-40BF-AE9E-D03CFE50A8AC}" type="slidenum">
               <a:rPr lang="en-CA" smtClean="0"/>
+              <a:pPr/>
               <a:t>‹#›</a:t>
             </a:fld>
             <a:endParaRPr lang="en-CA" dirty="0"/>
@@ -514,7 +516,8 @@
           <a:p>
             <a:fld id="{87B7D9A7-BEAE-440F-9607-82428B67954B}" type="datetimeFigureOut">
               <a:rPr lang="en-CA" smtClean="0"/>
-              <a:t>05/10/2010</a:t>
+              <a:pPr/>
+              <a:t>06/10/2010</a:t>
             </a:fld>
             <a:endParaRPr lang="en-CA" dirty="0"/>
           </a:p>
@@ -560,6 +563,7 @@
           <a:p>
             <a:fld id="{6D58B483-95C4-40BF-AE9E-D03CFE50A8AC}" type="slidenum">
               <a:rPr lang="en-CA" smtClean="0"/>
+              <a:pPr/>
               <a:t>‹#›</a:t>
             </a:fld>
             <a:endParaRPr lang="en-CA" dirty="0"/>
@@ -702,7 +706,8 @@
           <a:p>
             <a:fld id="{87B7D9A7-BEAE-440F-9607-82428B67954B}" type="datetimeFigureOut">
               <a:rPr lang="en-CA" smtClean="0"/>
-              <a:t>05/10/2010</a:t>
+              <a:pPr/>
+              <a:t>06/10/2010</a:t>
             </a:fld>
             <a:endParaRPr lang="en-CA" dirty="0"/>
           </a:p>
@@ -748,6 +753,7 @@
           <a:p>
             <a:fld id="{6D58B483-95C4-40BF-AE9E-D03CFE50A8AC}" type="slidenum">
               <a:rPr lang="en-CA" smtClean="0"/>
+              <a:pPr/>
               <a:t>‹#›</a:t>
             </a:fld>
             <a:endParaRPr lang="en-CA" dirty="0"/>
@@ -931,7 +937,8 @@
           <a:p>
             <a:fld id="{87B7D9A7-BEAE-440F-9607-82428B67954B}" type="datetimeFigureOut">
               <a:rPr lang="en-CA" smtClean="0"/>
-              <a:t>05/10/2010</a:t>
+              <a:pPr/>
+              <a:t>06/10/2010</a:t>
             </a:fld>
             <a:endParaRPr lang="en-CA" dirty="0"/>
           </a:p>
@@ -977,6 +984,7 @@
           <a:p>
             <a:fld id="{6D58B483-95C4-40BF-AE9E-D03CFE50A8AC}" type="slidenum">
               <a:rPr lang="en-CA" smtClean="0"/>
+              <a:pPr/>
               <a:t>‹#›</a:t>
             </a:fld>
             <a:endParaRPr lang="en-CA" dirty="0"/>
@@ -1212,7 +1220,8 @@
           <a:p>
             <a:fld id="{87B7D9A7-BEAE-440F-9607-82428B67954B}" type="datetimeFigureOut">
               <a:rPr lang="en-CA" smtClean="0"/>
-              <a:t>05/10/2010</a:t>
+              <a:pPr/>
+              <a:t>06/10/2010</a:t>
             </a:fld>
             <a:endParaRPr lang="en-CA" dirty="0"/>
           </a:p>
@@ -1251,6 +1260,7 @@
           <a:p>
             <a:fld id="{6D58B483-95C4-40BF-AE9E-D03CFE50A8AC}" type="slidenum">
               <a:rPr lang="en-CA" smtClean="0"/>
+              <a:pPr/>
               <a:t>‹#›</a:t>
             </a:fld>
             <a:endParaRPr lang="en-CA" dirty="0"/>
@@ -1500,7 +1510,8 @@
           <a:p>
             <a:fld id="{87B7D9A7-BEAE-440F-9607-82428B67954B}" type="datetimeFigureOut">
               <a:rPr lang="en-CA" smtClean="0"/>
-              <a:t>05/10/2010</a:t>
+              <a:pPr/>
+              <a:t>06/10/2010</a:t>
             </a:fld>
             <a:endParaRPr lang="en-CA" dirty="0"/>
           </a:p>
@@ -1551,6 +1562,7 @@
           <a:p>
             <a:fld id="{6D58B483-95C4-40BF-AE9E-D03CFE50A8AC}" type="slidenum">
               <a:rPr lang="en-CA" smtClean="0"/>
+              <a:pPr/>
               <a:t>‹#›</a:t>
             </a:fld>
             <a:endParaRPr lang="en-CA" dirty="0"/>
@@ -2054,7 +2066,8 @@
           <a:p>
             <a:fld id="{87B7D9A7-BEAE-440F-9607-82428B67954B}" type="datetimeFigureOut">
               <a:rPr lang="en-CA" smtClean="0"/>
-              <a:t>05/10/2010</a:t>
+              <a:pPr/>
+              <a:t>06/10/2010</a:t>
             </a:fld>
             <a:endParaRPr lang="en-CA" dirty="0"/>
           </a:p>
@@ -2105,6 +2118,7 @@
           <a:p>
             <a:fld id="{6D58B483-95C4-40BF-AE9E-D03CFE50A8AC}" type="slidenum">
               <a:rPr lang="en-CA" smtClean="0"/>
+              <a:pPr/>
               <a:t>‹#›</a:t>
             </a:fld>
             <a:endParaRPr lang="en-CA" dirty="0"/>
@@ -2185,7 +2199,8 @@
           <a:p>
             <a:fld id="{87B7D9A7-BEAE-440F-9607-82428B67954B}" type="datetimeFigureOut">
               <a:rPr lang="en-CA" smtClean="0"/>
-              <a:t>05/10/2010</a:t>
+              <a:pPr/>
+              <a:t>06/10/2010</a:t>
             </a:fld>
             <a:endParaRPr lang="en-CA" dirty="0"/>
           </a:p>
@@ -2231,6 +2246,7 @@
           <a:p>
             <a:fld id="{6D58B483-95C4-40BF-AE9E-D03CFE50A8AC}" type="slidenum">
               <a:rPr lang="en-CA" smtClean="0"/>
+              <a:pPr/>
               <a:t>‹#›</a:t>
             </a:fld>
             <a:endParaRPr lang="en-CA" dirty="0"/>
@@ -2335,7 +2351,8 @@
           <a:p>
             <a:fld id="{87B7D9A7-BEAE-440F-9607-82428B67954B}" type="datetimeFigureOut">
               <a:rPr lang="en-CA" smtClean="0"/>
-              <a:t>05/10/2010</a:t>
+              <a:pPr/>
+              <a:t>06/10/2010</a:t>
             </a:fld>
             <a:endParaRPr lang="en-CA" dirty="0"/>
           </a:p>
@@ -2381,6 +2398,7 @@
           <a:p>
             <a:fld id="{6D58B483-95C4-40BF-AE9E-D03CFE50A8AC}" type="slidenum">
               <a:rPr lang="en-CA" smtClean="0"/>
+              <a:pPr/>
               <a:t>‹#›</a:t>
             </a:fld>
             <a:endParaRPr lang="en-CA" dirty="0"/>
@@ -2656,7 +2674,8 @@
           <a:p>
             <a:fld id="{87B7D9A7-BEAE-440F-9607-82428B67954B}" type="datetimeFigureOut">
               <a:rPr lang="en-CA" smtClean="0"/>
-              <a:t>05/10/2010</a:t>
+              <a:pPr/>
+              <a:t>06/10/2010</a:t>
             </a:fld>
             <a:endParaRPr lang="en-CA" dirty="0"/>
           </a:p>
@@ -2695,6 +2714,7 @@
           <a:p>
             <a:fld id="{6D58B483-95C4-40BF-AE9E-D03CFE50A8AC}" type="slidenum">
               <a:rPr lang="en-CA" smtClean="0"/>
+              <a:pPr/>
               <a:t>‹#›</a:t>
             </a:fld>
             <a:endParaRPr lang="en-CA" dirty="0"/>
@@ -2953,7 +2973,8 @@
           <a:p>
             <a:fld id="{87B7D9A7-BEAE-440F-9607-82428B67954B}" type="datetimeFigureOut">
               <a:rPr lang="en-CA" smtClean="0"/>
-              <a:t>05/10/2010</a:t>
+              <a:pPr/>
+              <a:t>06/10/2010</a:t>
             </a:fld>
             <a:endParaRPr lang="en-CA" dirty="0"/>
           </a:p>
@@ -2992,6 +3013,7 @@
           <a:p>
             <a:fld id="{6D58B483-95C4-40BF-AE9E-D03CFE50A8AC}" type="slidenum">
               <a:rPr lang="en-CA" smtClean="0"/>
+              <a:pPr/>
               <a:t>‹#›</a:t>
             </a:fld>
             <a:endParaRPr lang="en-CA" dirty="0"/>
@@ -3198,7 +3220,8 @@
           <a:p>
             <a:fld id="{87B7D9A7-BEAE-440F-9607-82428B67954B}" type="datetimeFigureOut">
               <a:rPr lang="en-CA" smtClean="0"/>
-              <a:t>05/10/2010</a:t>
+              <a:pPr/>
+              <a:t>06/10/2010</a:t>
             </a:fld>
             <a:endParaRPr lang="en-CA" dirty="0"/>
           </a:p>
@@ -3241,6 +3264,7 @@
           <a:p>
             <a:fld id="{6D58B483-95C4-40BF-AE9E-D03CFE50A8AC}" type="slidenum">
               <a:rPr lang="en-CA" smtClean="0"/>
+              <a:pPr/>
               <a:t>‹#›</a:t>
             </a:fld>
             <a:endParaRPr lang="en-CA" dirty="0"/>
@@ -3990,7 +4014,7 @@
       </p:grpSpPr>
       <p:sp>
         <p:nvSpPr>
-          <p:cNvPr id="5" name="Title 4"/>
+          <p:cNvPr id="2" name="Title 1"/>
           <p:cNvSpPr>
             <a:spLocks noGrp="1"/>
           </p:cNvSpPr>
@@ -4011,2973 +4035,104 @@
           </a:p>
         </p:txBody>
       </p:sp>
-      <p:sp>
-        <p:nvSpPr>
-          <p:cNvPr id="6" name="Content Placeholder 5"/>
-          <p:cNvSpPr>
-            <a:spLocks noGrp="1"/>
-          </p:cNvSpPr>
+      <p:pic>
+        <p:nvPicPr>
+          <p:cNvPr id="1026" name="Picture 2"/>
+          <p:cNvPicPr>
+            <a:picLocks noChangeAspect="1" noChangeArrowheads="1"/>
+          </p:cNvPicPr>
+          <p:nvPr/>
+        </p:nvPicPr>
+        <p:blipFill>
+          <a:blip r:embed="rId2" cstate="print"/>
+          <a:srcRect/>
+          <a:stretch>
+            <a:fillRect/>
+          </a:stretch>
+        </p:blipFill>
+        <p:spPr bwMode="auto">
+          <a:xfrm>
+            <a:off x="611560" y="1700808"/>
+            <a:ext cx="2592288" cy="3071861"/>
+          </a:xfrm>
+          <a:prstGeom prst="rect">
+            <a:avLst/>
+          </a:prstGeom>
+          <a:noFill/>
+          <a:ln w="9525">
+            <a:noFill/>
+            <a:miter lim="800000"/>
+            <a:headEnd/>
+            <a:tailEnd/>
+          </a:ln>
+        </p:spPr>
+      </p:pic>
+      <p:pic>
+        <p:nvPicPr>
+          <p:cNvPr id="1028" name="Picture 4"/>
+          <p:cNvPicPr>
+            <a:picLocks noGrp="1" noChangeAspect="1" noChangeArrowheads="1"/>
+          </p:cNvPicPr>
           <p:nvPr>
             <p:ph idx="1"/>
           </p:nvPr>
-        </p:nvSpPr>
-        <p:spPr/>
-        <p:txBody>
-          <a:bodyPr/>
-          <a:lstStyle/>
-          <a:p>
-            <a:endParaRPr lang="en-CA"/>
-          </a:p>
-        </p:txBody>
-      </p:sp>
-      <p:grpSp>
-        <p:nvGrpSpPr>
-          <p:cNvPr id="2051" name="Group 3"/>
-          <p:cNvGrpSpPr>
-            <a:grpSpLocks/>
-          </p:cNvGrpSpPr>
+        </p:nvPicPr>
+        <p:blipFill>
+          <a:blip r:embed="rId3" cstate="print"/>
+          <a:srcRect/>
+          <a:stretch>
+            <a:fillRect/>
+          </a:stretch>
+        </p:blipFill>
+        <p:spPr bwMode="auto">
+          <a:xfrm>
+            <a:off x="6084168" y="1700808"/>
+            <a:ext cx="2304256" cy="2363339"/>
+          </a:xfrm>
+          <a:prstGeom prst="rect">
+            <a:avLst/>
+          </a:prstGeom>
+          <a:noFill/>
+          <a:ln w="9525">
+            <a:noFill/>
+            <a:miter lim="800000"/>
+            <a:headEnd/>
+            <a:tailEnd/>
+          </a:ln>
+        </p:spPr>
+      </p:pic>
+      <p:pic>
+        <p:nvPicPr>
+          <p:cNvPr id="1029" name="Picture 5"/>
+          <p:cNvPicPr>
+            <a:picLocks noChangeAspect="1" noChangeArrowheads="1"/>
+          </p:cNvPicPr>
           <p:nvPr/>
-        </p:nvGrpSpPr>
-        <p:grpSpPr bwMode="auto">
-          <a:xfrm>
-            <a:off x="1711325" y="1182688"/>
-            <a:ext cx="4460875" cy="7497762"/>
-            <a:chOff x="1560" y="177"/>
-            <a:chExt cx="7024" cy="11805"/>
-          </a:xfrm>
-        </p:grpSpPr>
-        <p:sp>
-          <p:nvSpPr>
-            <p:cNvPr id="2052" name="Rectangle 4"/>
-            <p:cNvSpPr>
-              <a:spLocks noChangeArrowheads="1"/>
-            </p:cNvSpPr>
-            <p:nvPr/>
-          </p:nvSpPr>
-          <p:spPr bwMode="auto">
-            <a:xfrm>
-              <a:off x="4397" y="177"/>
-              <a:ext cx="4187" cy="11805"/>
-            </a:xfrm>
-            <a:prstGeom prst="rect">
-              <a:avLst/>
-            </a:prstGeom>
+        </p:nvPicPr>
+        <p:blipFill>
+          <a:blip r:embed="rId4" cstate="print"/>
+          <a:srcRect/>
+          <a:stretch>
+            <a:fillRect/>
+          </a:stretch>
+        </p:blipFill>
+        <p:spPr bwMode="auto">
+          <a:xfrm>
+            <a:off x="3347864" y="1700808"/>
+            <a:ext cx="2591476" cy="2358380"/>
+          </a:xfrm>
+          <a:prstGeom prst="rect">
+            <a:avLst/>
+          </a:prstGeom>
+          <a:noFill/>
+          <a:ln w="9525">
             <a:noFill/>
-            <a:ln w="9360">
-              <a:solidFill>
-                <a:srgbClr val="000000"/>
-              </a:solidFill>
-              <a:round/>
-              <a:headEnd/>
-              <a:tailEnd/>
-            </a:ln>
-            <a:effectLst/>
-          </p:spPr>
-          <p:txBody>
-            <a:bodyPr vert="horz" wrap="none" lIns="91440" tIns="45720" rIns="91440" bIns="45720" numCol="1" anchor="ctr" anchorCtr="0" compatLnSpc="1">
-              <a:prstTxWarp prst="textNoShape">
-                <a:avLst/>
-              </a:prstTxWarp>
-            </a:bodyPr>
-            <a:lstStyle/>
-            <a:p>
-              <a:endParaRPr lang="en-CA"/>
-            </a:p>
-          </p:txBody>
-        </p:sp>
-        <p:grpSp>
-          <p:nvGrpSpPr>
-            <p:cNvPr id="2053" name="Group 5"/>
-            <p:cNvGrpSpPr>
-              <a:grpSpLocks/>
-            </p:cNvGrpSpPr>
-            <p:nvPr/>
-          </p:nvGrpSpPr>
-          <p:grpSpPr bwMode="auto">
-            <a:xfrm>
-              <a:off x="1560" y="724"/>
-              <a:ext cx="6732" cy="10804"/>
-              <a:chOff x="1560" y="724"/>
-              <a:chExt cx="6732" cy="10804"/>
-            </a:xfrm>
-          </p:grpSpPr>
-          <p:grpSp>
-            <p:nvGrpSpPr>
-              <p:cNvPr id="2054" name="Group 6"/>
-              <p:cNvGrpSpPr>
-                <a:grpSpLocks/>
-              </p:cNvGrpSpPr>
-              <p:nvPr/>
-            </p:nvGrpSpPr>
-            <p:grpSpPr bwMode="auto">
-              <a:xfrm>
-                <a:off x="5035" y="724"/>
-                <a:ext cx="3186" cy="762"/>
-                <a:chOff x="5035" y="724"/>
-                <a:chExt cx="3186" cy="762"/>
-              </a:xfrm>
-            </p:grpSpPr>
-            <p:sp>
-              <p:nvSpPr>
-                <p:cNvPr id="2055" name="Oval 7"/>
-                <p:cNvSpPr>
-                  <a:spLocks noChangeArrowheads="1"/>
-                </p:cNvSpPr>
-                <p:nvPr/>
-              </p:nvSpPr>
-              <p:spPr bwMode="auto">
-                <a:xfrm>
-                  <a:off x="5035" y="724"/>
-                  <a:ext cx="3186" cy="762"/>
-                </a:xfrm>
-                <a:prstGeom prst="ellipse">
-                  <a:avLst/>
-                </a:prstGeom>
-                <a:noFill/>
-                <a:ln w="9360">
-                  <a:solidFill>
-                    <a:srgbClr val="000000"/>
-                  </a:solidFill>
-                  <a:round/>
-                  <a:headEnd/>
-                  <a:tailEnd/>
-                </a:ln>
-                <a:effectLst/>
-              </p:spPr>
-              <p:txBody>
-                <a:bodyPr vert="horz" wrap="none" lIns="91440" tIns="45720" rIns="91440" bIns="45720" numCol="1" anchor="ctr" anchorCtr="0" compatLnSpc="1">
-                  <a:prstTxWarp prst="textNoShape">
-                    <a:avLst/>
-                  </a:prstTxWarp>
-                </a:bodyPr>
-                <a:lstStyle/>
-                <a:p>
-                  <a:endParaRPr lang="en-CA"/>
-                </a:p>
-              </p:txBody>
-            </p:sp>
-            <p:sp>
-              <p:nvSpPr>
-                <p:cNvPr id="2056" name="Text Box 8"/>
-                <p:cNvSpPr txBox="1">
-                  <a:spLocks noChangeArrowheads="1"/>
-                </p:cNvSpPr>
-                <p:nvPr/>
-              </p:nvSpPr>
-              <p:spPr bwMode="auto">
-                <a:xfrm>
-                  <a:off x="5292" y="891"/>
-                  <a:ext cx="2687" cy="410"/>
-                </a:xfrm>
-                <a:prstGeom prst="rect">
-                  <a:avLst/>
-                </a:prstGeom>
-                <a:noFill/>
-                <a:ln w="9525">
-                  <a:noFill/>
-                  <a:round/>
-                  <a:headEnd/>
-                  <a:tailEnd/>
-                </a:ln>
-                <a:effectLst/>
-              </p:spPr>
-              <p:txBody>
-                <a:bodyPr vert="horz" wrap="square" lIns="0" tIns="0" rIns="0" bIns="0" numCol="1" anchor="t" anchorCtr="0" compatLnSpc="1">
-                  <a:prstTxWarp prst="textNoShape">
-                    <a:avLst/>
-                  </a:prstTxWarp>
-                </a:bodyPr>
-                <a:lstStyle/>
-                <a:p>
-                  <a:pPr marL="0" marR="0" lvl="0" indent="0" algn="ctr" defTabSz="914400" rtl="0" eaLnBrk="1" fontAlgn="base" latinLnBrk="0" hangingPunct="1">
-                    <a:lnSpc>
-                      <a:spcPct val="100000"/>
-                    </a:lnSpc>
-                    <a:spcBef>
-                      <a:spcPct val="0"/>
-                    </a:spcBef>
-                    <a:spcAft>
-                      <a:spcPts val="1000"/>
-                    </a:spcAft>
-                    <a:buClrTx/>
-                    <a:buSzTx/>
-                    <a:buFontTx/>
-                    <a:buNone/>
-                    <a:tabLst/>
-                  </a:pPr>
-                  <a:r>
-                    <a:rPr kumimoji="0" lang="en-CA" sz="1200" b="0" i="0" u="none" strike="noStrike" cap="none" normalizeH="0" baseline="0" smtClean="0">
-                      <a:ln>
-                        <a:noFill/>
-                      </a:ln>
-                      <a:solidFill>
-                        <a:srgbClr val="000000"/>
-                      </a:solidFill>
-                      <a:effectLst/>
-                      <a:latin typeface="Times New Roman" pitchFamily="18" charset="0"/>
-                      <a:cs typeface="Arial" pitchFamily="34" charset="0"/>
-                    </a:rPr>
-                    <a:t>Site </a:t>
-                  </a:r>
-                  <a:r>
-                    <a:rPr kumimoji="0" lang="en-CA" sz="1200" b="0" i="0" u="none" strike="noStrike" cap="none" normalizeH="0" baseline="0" smtClean="0">
-                      <a:ln>
-                        <a:noFill/>
-                      </a:ln>
-                      <a:solidFill>
-                        <a:schemeClr val="tx1"/>
-                      </a:solidFill>
-                      <a:effectLst/>
-                      <a:latin typeface="Times New Roman" pitchFamily="18" charset="0"/>
-                      <a:cs typeface="Arial" pitchFamily="34" charset="0"/>
-                    </a:rPr>
-                    <a:t>Sign Up</a:t>
-                  </a:r>
-                  <a:endParaRPr kumimoji="0" lang="en-US" sz="1800" b="0" i="0" u="none" strike="noStrike" cap="none" normalizeH="0" baseline="0" smtClean="0">
-                    <a:ln>
-                      <a:noFill/>
-                    </a:ln>
-                    <a:solidFill>
-                      <a:schemeClr val="tx1"/>
-                    </a:solidFill>
-                    <a:effectLst/>
-                    <a:latin typeface="Arial" pitchFamily="34" charset="0"/>
-                    <a:cs typeface="Arial" pitchFamily="34" charset="0"/>
-                  </a:endParaRPr>
-                </a:p>
-              </p:txBody>
-            </p:sp>
-          </p:grpSp>
-          <p:grpSp>
-            <p:nvGrpSpPr>
-              <p:cNvPr id="2057" name="Group 9"/>
-              <p:cNvGrpSpPr>
-                <a:grpSpLocks/>
-              </p:cNvGrpSpPr>
-              <p:nvPr/>
-            </p:nvGrpSpPr>
-            <p:grpSpPr bwMode="auto">
-              <a:xfrm>
-                <a:off x="5070" y="1618"/>
-                <a:ext cx="3186" cy="806"/>
-                <a:chOff x="5070" y="1618"/>
-                <a:chExt cx="3186" cy="806"/>
-              </a:xfrm>
-            </p:grpSpPr>
-            <p:sp>
-              <p:nvSpPr>
-                <p:cNvPr id="2058" name="Oval 10"/>
-                <p:cNvSpPr>
-                  <a:spLocks noChangeArrowheads="1"/>
-                </p:cNvSpPr>
-                <p:nvPr/>
-              </p:nvSpPr>
-              <p:spPr bwMode="auto">
-                <a:xfrm>
-                  <a:off x="5070" y="1618"/>
-                  <a:ext cx="3186" cy="806"/>
-                </a:xfrm>
-                <a:prstGeom prst="ellipse">
-                  <a:avLst/>
-                </a:prstGeom>
-                <a:noFill/>
-                <a:ln w="9360">
-                  <a:solidFill>
-                    <a:srgbClr val="000000"/>
-                  </a:solidFill>
-                  <a:round/>
-                  <a:headEnd/>
-                  <a:tailEnd/>
-                </a:ln>
-                <a:effectLst/>
-              </p:spPr>
-              <p:txBody>
-                <a:bodyPr vert="horz" wrap="none" lIns="91440" tIns="45720" rIns="91440" bIns="45720" numCol="1" anchor="ctr" anchorCtr="0" compatLnSpc="1">
-                  <a:prstTxWarp prst="textNoShape">
-                    <a:avLst/>
-                  </a:prstTxWarp>
-                </a:bodyPr>
-                <a:lstStyle/>
-                <a:p>
-                  <a:endParaRPr lang="en-CA"/>
-                </a:p>
-              </p:txBody>
-            </p:sp>
-            <p:sp>
-              <p:nvSpPr>
-                <p:cNvPr id="2059" name="Text Box 11"/>
-                <p:cNvSpPr txBox="1">
-                  <a:spLocks noChangeArrowheads="1"/>
-                </p:cNvSpPr>
-                <p:nvPr/>
-              </p:nvSpPr>
-              <p:spPr bwMode="auto">
-                <a:xfrm>
-                  <a:off x="5326" y="1796"/>
-                  <a:ext cx="2687" cy="434"/>
-                </a:xfrm>
-                <a:prstGeom prst="rect">
-                  <a:avLst/>
-                </a:prstGeom>
-                <a:noFill/>
-                <a:ln w="9525">
-                  <a:noFill/>
-                  <a:round/>
-                  <a:headEnd/>
-                  <a:tailEnd/>
-                </a:ln>
-                <a:effectLst/>
-              </p:spPr>
-              <p:txBody>
-                <a:bodyPr vert="horz" wrap="square" lIns="0" tIns="0" rIns="0" bIns="0" numCol="1" anchor="t" anchorCtr="0" compatLnSpc="1">
-                  <a:prstTxWarp prst="textNoShape">
-                    <a:avLst/>
-                  </a:prstTxWarp>
-                </a:bodyPr>
-                <a:lstStyle/>
-                <a:p>
-                  <a:pPr marL="0" marR="0" lvl="0" indent="0" algn="ctr" defTabSz="914400" rtl="0" eaLnBrk="1" fontAlgn="base" latinLnBrk="0" hangingPunct="1">
-                    <a:lnSpc>
-                      <a:spcPct val="100000"/>
-                    </a:lnSpc>
-                    <a:spcBef>
-                      <a:spcPct val="0"/>
-                    </a:spcBef>
-                    <a:spcAft>
-                      <a:spcPts val="1000"/>
-                    </a:spcAft>
-                    <a:buClrTx/>
-                    <a:buSzTx/>
-                    <a:buFontTx/>
-                    <a:buNone/>
-                    <a:tabLst/>
-                  </a:pPr>
-                  <a:r>
-                    <a:rPr kumimoji="0" lang="en-CA" sz="1200" b="0" i="0" u="none" strike="noStrike" cap="none" normalizeH="0" baseline="0" smtClean="0">
-                      <a:ln>
-                        <a:noFill/>
-                      </a:ln>
-                      <a:solidFill>
-                        <a:schemeClr val="tx1"/>
-                      </a:solidFill>
-                      <a:effectLst/>
-                      <a:latin typeface="Times New Roman" pitchFamily="18" charset="0"/>
-                      <a:cs typeface="Arial" pitchFamily="34" charset="0"/>
-                    </a:rPr>
-                    <a:t>Manage Avaliable Jobs</a:t>
-                  </a:r>
-                  <a:endParaRPr kumimoji="0" lang="en-US" sz="1800" b="0" i="0" u="none" strike="noStrike" cap="none" normalizeH="0" baseline="0" smtClean="0">
-                    <a:ln>
-                      <a:noFill/>
-                    </a:ln>
-                    <a:solidFill>
-                      <a:schemeClr val="tx1"/>
-                    </a:solidFill>
-                    <a:effectLst/>
-                    <a:latin typeface="Arial" pitchFamily="34" charset="0"/>
-                    <a:cs typeface="Arial" pitchFamily="34" charset="0"/>
-                  </a:endParaRPr>
-                </a:p>
-              </p:txBody>
-            </p:sp>
-          </p:grpSp>
-          <p:grpSp>
-            <p:nvGrpSpPr>
-              <p:cNvPr id="2060" name="Group 12"/>
-              <p:cNvGrpSpPr>
-                <a:grpSpLocks/>
-              </p:cNvGrpSpPr>
-              <p:nvPr/>
-            </p:nvGrpSpPr>
-            <p:grpSpPr bwMode="auto">
-              <a:xfrm>
-                <a:off x="5050" y="4864"/>
-                <a:ext cx="3186" cy="798"/>
-                <a:chOff x="5050" y="4864"/>
-                <a:chExt cx="3186" cy="798"/>
-              </a:xfrm>
-            </p:grpSpPr>
-            <p:sp>
-              <p:nvSpPr>
-                <p:cNvPr id="2061" name="Oval 13"/>
-                <p:cNvSpPr>
-                  <a:spLocks noChangeArrowheads="1"/>
-                </p:cNvSpPr>
-                <p:nvPr/>
-              </p:nvSpPr>
-              <p:spPr bwMode="auto">
-                <a:xfrm>
-                  <a:off x="5050" y="4864"/>
-                  <a:ext cx="3186" cy="798"/>
-                </a:xfrm>
-                <a:prstGeom prst="ellipse">
-                  <a:avLst/>
-                </a:prstGeom>
-                <a:noFill/>
-                <a:ln w="9360">
-                  <a:solidFill>
-                    <a:srgbClr val="000000"/>
-                  </a:solidFill>
-                  <a:round/>
-                  <a:headEnd/>
-                  <a:tailEnd/>
-                </a:ln>
-                <a:effectLst/>
-              </p:spPr>
-              <p:txBody>
-                <a:bodyPr vert="horz" wrap="none" lIns="91440" tIns="45720" rIns="91440" bIns="45720" numCol="1" anchor="ctr" anchorCtr="0" compatLnSpc="1">
-                  <a:prstTxWarp prst="textNoShape">
-                    <a:avLst/>
-                  </a:prstTxWarp>
-                </a:bodyPr>
-                <a:lstStyle/>
-                <a:p>
-                  <a:endParaRPr lang="en-CA"/>
-                </a:p>
-              </p:txBody>
-            </p:sp>
-            <p:sp>
-              <p:nvSpPr>
-                <p:cNvPr id="2062" name="Text Box 14"/>
-                <p:cNvSpPr txBox="1">
-                  <a:spLocks noChangeArrowheads="1"/>
-                </p:cNvSpPr>
-                <p:nvPr/>
-              </p:nvSpPr>
-              <p:spPr bwMode="auto">
-                <a:xfrm>
-                  <a:off x="5306" y="5041"/>
-                  <a:ext cx="2687" cy="429"/>
-                </a:xfrm>
-                <a:prstGeom prst="rect">
-                  <a:avLst/>
-                </a:prstGeom>
-                <a:noFill/>
-                <a:ln w="9525">
-                  <a:noFill/>
-                  <a:round/>
-                  <a:headEnd/>
-                  <a:tailEnd/>
-                </a:ln>
-                <a:effectLst/>
-              </p:spPr>
-              <p:txBody>
-                <a:bodyPr vert="horz" wrap="square" lIns="0" tIns="0" rIns="0" bIns="0" numCol="1" anchor="t" anchorCtr="0" compatLnSpc="1">
-                  <a:prstTxWarp prst="textNoShape">
-                    <a:avLst/>
-                  </a:prstTxWarp>
-                </a:bodyPr>
-                <a:lstStyle/>
-                <a:p>
-                  <a:pPr marL="0" marR="0" lvl="0" indent="0" algn="ctr" defTabSz="914400" rtl="0" eaLnBrk="1" fontAlgn="base" latinLnBrk="0" hangingPunct="1">
-                    <a:lnSpc>
-                      <a:spcPct val="100000"/>
-                    </a:lnSpc>
-                    <a:spcBef>
-                      <a:spcPct val="0"/>
-                    </a:spcBef>
-                    <a:spcAft>
-                      <a:spcPts val="1000"/>
-                    </a:spcAft>
-                    <a:buClrTx/>
-                    <a:buSzTx/>
-                    <a:buFontTx/>
-                    <a:buNone/>
-                    <a:tabLst/>
-                  </a:pPr>
-                  <a:r>
-                    <a:rPr kumimoji="0" lang="en-CA" sz="1200" b="0" i="0" u="none" strike="noStrike" cap="none" normalizeH="0" baseline="0" smtClean="0">
-                      <a:ln>
-                        <a:noFill/>
-                      </a:ln>
-                      <a:solidFill>
-                        <a:srgbClr val="000000"/>
-                      </a:solidFill>
-                      <a:effectLst/>
-                      <a:latin typeface="Times New Roman" pitchFamily="18" charset="0"/>
-                      <a:cs typeface="Arial" pitchFamily="34" charset="0"/>
-                    </a:rPr>
-                    <a:t>Site Sign Up</a:t>
-                  </a:r>
-                  <a:endParaRPr kumimoji="0" lang="en-US" sz="1800" b="0" i="0" u="none" strike="noStrike" cap="none" normalizeH="0" baseline="0" smtClean="0">
-                    <a:ln>
-                      <a:noFill/>
-                    </a:ln>
-                    <a:solidFill>
-                      <a:schemeClr val="tx1"/>
-                    </a:solidFill>
-                    <a:effectLst/>
-                    <a:latin typeface="Arial" pitchFamily="34" charset="0"/>
-                    <a:cs typeface="Arial" pitchFamily="34" charset="0"/>
-                  </a:endParaRPr>
-                </a:p>
-              </p:txBody>
-            </p:sp>
-          </p:grpSp>
-          <p:grpSp>
-            <p:nvGrpSpPr>
-              <p:cNvPr id="2063" name="Group 15"/>
-              <p:cNvGrpSpPr>
-                <a:grpSpLocks/>
-              </p:cNvGrpSpPr>
-              <p:nvPr/>
-            </p:nvGrpSpPr>
-            <p:grpSpPr bwMode="auto">
-              <a:xfrm>
-                <a:off x="5037" y="5808"/>
-                <a:ext cx="3185" cy="923"/>
-                <a:chOff x="5037" y="5808"/>
-                <a:chExt cx="3185" cy="923"/>
-              </a:xfrm>
-            </p:grpSpPr>
-            <p:sp>
-              <p:nvSpPr>
-                <p:cNvPr id="2064" name="Oval 16"/>
-                <p:cNvSpPr>
-                  <a:spLocks noChangeArrowheads="1"/>
-                </p:cNvSpPr>
-                <p:nvPr/>
-              </p:nvSpPr>
-              <p:spPr bwMode="auto">
-                <a:xfrm>
-                  <a:off x="5037" y="5808"/>
-                  <a:ext cx="3185" cy="923"/>
-                </a:xfrm>
-                <a:prstGeom prst="ellipse">
-                  <a:avLst/>
-                </a:prstGeom>
-                <a:noFill/>
-                <a:ln w="9360">
-                  <a:solidFill>
-                    <a:srgbClr val="000000"/>
-                  </a:solidFill>
-                  <a:round/>
-                  <a:headEnd/>
-                  <a:tailEnd/>
-                </a:ln>
-                <a:effectLst/>
-              </p:spPr>
-              <p:txBody>
-                <a:bodyPr vert="horz" wrap="none" lIns="91440" tIns="45720" rIns="91440" bIns="45720" numCol="1" anchor="ctr" anchorCtr="0" compatLnSpc="1">
-                  <a:prstTxWarp prst="textNoShape">
-                    <a:avLst/>
-                  </a:prstTxWarp>
-                </a:bodyPr>
-                <a:lstStyle/>
-                <a:p>
-                  <a:endParaRPr lang="en-CA"/>
-                </a:p>
-              </p:txBody>
-            </p:sp>
-            <p:sp>
-              <p:nvSpPr>
-                <p:cNvPr id="2065" name="Text Box 17"/>
-                <p:cNvSpPr txBox="1">
-                  <a:spLocks noChangeArrowheads="1"/>
-                </p:cNvSpPr>
-                <p:nvPr/>
-              </p:nvSpPr>
-              <p:spPr bwMode="auto">
-                <a:xfrm>
-                  <a:off x="5293" y="6012"/>
-                  <a:ext cx="2687" cy="504"/>
-                </a:xfrm>
-                <a:prstGeom prst="rect">
-                  <a:avLst/>
-                </a:prstGeom>
-                <a:noFill/>
-                <a:ln w="9525">
-                  <a:noFill/>
-                  <a:round/>
-                  <a:headEnd/>
-                  <a:tailEnd/>
-                </a:ln>
-                <a:effectLst/>
-              </p:spPr>
-              <p:txBody>
-                <a:bodyPr vert="horz" wrap="square" lIns="0" tIns="0" rIns="0" bIns="0" numCol="1" anchor="t" anchorCtr="0" compatLnSpc="1">
-                  <a:prstTxWarp prst="textNoShape">
-                    <a:avLst/>
-                  </a:prstTxWarp>
-                </a:bodyPr>
-                <a:lstStyle/>
-                <a:p>
-                  <a:pPr marL="0" marR="0" lvl="0" indent="0" algn="ctr" defTabSz="914400" rtl="0" eaLnBrk="1" fontAlgn="base" latinLnBrk="0" hangingPunct="1">
-                    <a:lnSpc>
-                      <a:spcPct val="100000"/>
-                    </a:lnSpc>
-                    <a:spcBef>
-                      <a:spcPct val="0"/>
-                    </a:spcBef>
-                    <a:spcAft>
-                      <a:spcPts val="1000"/>
-                    </a:spcAft>
-                    <a:buClrTx/>
-                    <a:buSzTx/>
-                    <a:buFontTx/>
-                    <a:buNone/>
-                    <a:tabLst/>
-                  </a:pPr>
-                  <a:r>
-                    <a:rPr kumimoji="0" lang="en-CA" sz="1200" b="0" i="0" u="none" strike="noStrike" cap="none" normalizeH="0" baseline="0" smtClean="0">
-                      <a:ln>
-                        <a:noFill/>
-                      </a:ln>
-                      <a:solidFill>
-                        <a:schemeClr val="tx1"/>
-                      </a:solidFill>
-                      <a:effectLst/>
-                      <a:latin typeface="Times New Roman" pitchFamily="18" charset="0"/>
-                      <a:cs typeface="Arial" pitchFamily="34" charset="0"/>
-                    </a:rPr>
-                    <a:t>Search for / Respond to </a:t>
-                  </a:r>
-                </a:p>
-                <a:p>
-                  <a:pPr marL="0" marR="0" lvl="0" indent="0" algn="ctr" defTabSz="914400" rtl="0" eaLnBrk="1" fontAlgn="base" latinLnBrk="0" hangingPunct="1">
-                    <a:lnSpc>
-                      <a:spcPct val="100000"/>
-                    </a:lnSpc>
-                    <a:spcBef>
-                      <a:spcPct val="0"/>
-                    </a:spcBef>
-                    <a:spcAft>
-                      <a:spcPts val="1000"/>
-                    </a:spcAft>
-                    <a:buClrTx/>
-                    <a:buSzTx/>
-                    <a:buFontTx/>
-                    <a:buNone/>
-                    <a:tabLst/>
-                  </a:pPr>
-                  <a:r>
-                    <a:rPr kumimoji="0" lang="en-CA" sz="1200" b="0" i="0" u="none" strike="noStrike" cap="none" normalizeH="0" baseline="0" smtClean="0">
-                      <a:ln>
-                        <a:noFill/>
-                      </a:ln>
-                      <a:solidFill>
-                        <a:schemeClr val="tx1"/>
-                      </a:solidFill>
-                      <a:effectLst/>
-                      <a:latin typeface="Times New Roman" pitchFamily="18" charset="0"/>
-                      <a:cs typeface="Arial" pitchFamily="34" charset="0"/>
-                    </a:rPr>
-                    <a:t>Volunteer Job Ads</a:t>
-                  </a:r>
-                  <a:endParaRPr kumimoji="0" lang="en-US" sz="1800" b="0" i="0" u="none" strike="noStrike" cap="none" normalizeH="0" baseline="0" smtClean="0">
-                    <a:ln>
-                      <a:noFill/>
-                    </a:ln>
-                    <a:solidFill>
-                      <a:schemeClr val="tx1"/>
-                    </a:solidFill>
-                    <a:effectLst/>
-                    <a:latin typeface="Arial" pitchFamily="34" charset="0"/>
-                    <a:cs typeface="Arial" pitchFamily="34" charset="0"/>
-                  </a:endParaRPr>
-                </a:p>
-              </p:txBody>
-            </p:sp>
-          </p:grpSp>
-          <p:grpSp>
-            <p:nvGrpSpPr>
-              <p:cNvPr id="2066" name="Group 18"/>
-              <p:cNvGrpSpPr>
-                <a:grpSpLocks/>
-              </p:cNvGrpSpPr>
-              <p:nvPr/>
-            </p:nvGrpSpPr>
-            <p:grpSpPr bwMode="auto">
-              <a:xfrm>
-                <a:off x="1630" y="1332"/>
-                <a:ext cx="1791" cy="1371"/>
-                <a:chOff x="1630" y="1332"/>
-                <a:chExt cx="1791" cy="1371"/>
-              </a:xfrm>
-            </p:grpSpPr>
-            <p:grpSp>
-              <p:nvGrpSpPr>
-                <p:cNvPr id="2067" name="Group 19"/>
-                <p:cNvGrpSpPr>
-                  <a:grpSpLocks/>
-                </p:cNvGrpSpPr>
-                <p:nvPr/>
-              </p:nvGrpSpPr>
-              <p:grpSpPr bwMode="auto">
-                <a:xfrm>
-                  <a:off x="2271" y="1332"/>
-                  <a:ext cx="472" cy="990"/>
-                  <a:chOff x="2271" y="1332"/>
-                  <a:chExt cx="472" cy="990"/>
-                </a:xfrm>
-              </p:grpSpPr>
-              <p:sp>
-                <p:nvSpPr>
-                  <p:cNvPr id="2068" name="Oval 20"/>
-                  <p:cNvSpPr>
-                    <a:spLocks noChangeArrowheads="1"/>
-                  </p:cNvSpPr>
-                  <p:nvPr/>
-                </p:nvSpPr>
-                <p:spPr bwMode="auto">
-                  <a:xfrm>
-                    <a:off x="2412" y="1332"/>
-                    <a:ext cx="241" cy="229"/>
-                  </a:xfrm>
-                  <a:prstGeom prst="ellipse">
-                    <a:avLst/>
-                  </a:prstGeom>
-                  <a:noFill/>
-                  <a:ln w="9360">
-                    <a:solidFill>
-                      <a:srgbClr val="000000"/>
-                    </a:solidFill>
-                    <a:round/>
-                    <a:headEnd/>
-                    <a:tailEnd/>
-                  </a:ln>
-                  <a:effectLst/>
-                </p:spPr>
-                <p:txBody>
-                  <a:bodyPr vert="horz" wrap="none" lIns="91440" tIns="45720" rIns="91440" bIns="45720" numCol="1" anchor="ctr" anchorCtr="0" compatLnSpc="1">
-                    <a:prstTxWarp prst="textNoShape">
-                      <a:avLst/>
-                    </a:prstTxWarp>
-                  </a:bodyPr>
-                  <a:lstStyle/>
-                  <a:p>
-                    <a:endParaRPr lang="en-CA"/>
-                  </a:p>
-                </p:txBody>
-              </p:sp>
-              <p:sp>
-                <p:nvSpPr>
-                  <p:cNvPr id="2069" name="Line 21"/>
-                  <p:cNvSpPr>
-                    <a:spLocks noChangeShapeType="1"/>
-                  </p:cNvSpPr>
-                  <p:nvPr/>
-                </p:nvSpPr>
-                <p:spPr bwMode="auto">
-                  <a:xfrm flipV="1">
-                    <a:off x="2527" y="1562"/>
-                    <a:ext cx="0" cy="505"/>
-                  </a:xfrm>
-                  <a:prstGeom prst="line">
-                    <a:avLst/>
-                  </a:prstGeom>
-                  <a:noFill/>
-                  <a:ln w="9360">
-                    <a:solidFill>
-                      <a:srgbClr val="000000"/>
-                    </a:solidFill>
-                    <a:round/>
-                    <a:headEnd/>
-                    <a:tailEnd/>
-                  </a:ln>
-                  <a:effectLst/>
-                </p:spPr>
-                <p:txBody>
-                  <a:bodyPr vert="horz" wrap="square" lIns="91440" tIns="45720" rIns="91440" bIns="45720" numCol="1" anchor="t" anchorCtr="0" compatLnSpc="1">
-                    <a:prstTxWarp prst="textNoShape">
-                      <a:avLst/>
-                    </a:prstTxWarp>
-                  </a:bodyPr>
-                  <a:lstStyle/>
-                  <a:p>
-                    <a:endParaRPr lang="en-CA"/>
-                  </a:p>
-                </p:txBody>
-              </p:sp>
-              <p:sp>
-                <p:nvSpPr>
-                  <p:cNvPr id="2070" name="Line 22"/>
-                  <p:cNvSpPr>
-                    <a:spLocks noChangeShapeType="1"/>
-                  </p:cNvSpPr>
-                  <p:nvPr/>
-                </p:nvSpPr>
-                <p:spPr bwMode="auto">
-                  <a:xfrm>
-                    <a:off x="2271" y="1678"/>
-                    <a:ext cx="472" cy="0"/>
-                  </a:xfrm>
-                  <a:prstGeom prst="line">
-                    <a:avLst/>
-                  </a:prstGeom>
-                  <a:noFill/>
-                  <a:ln w="9360">
-                    <a:solidFill>
-                      <a:srgbClr val="000000"/>
-                    </a:solidFill>
-                    <a:round/>
-                    <a:headEnd/>
-                    <a:tailEnd/>
-                  </a:ln>
-                  <a:effectLst/>
-                </p:spPr>
-                <p:txBody>
-                  <a:bodyPr vert="horz" wrap="square" lIns="91440" tIns="45720" rIns="91440" bIns="45720" numCol="1" anchor="t" anchorCtr="0" compatLnSpc="1">
-                    <a:prstTxWarp prst="textNoShape">
-                      <a:avLst/>
-                    </a:prstTxWarp>
-                  </a:bodyPr>
-                  <a:lstStyle/>
-                  <a:p>
-                    <a:endParaRPr lang="en-CA"/>
-                  </a:p>
-                </p:txBody>
-              </p:sp>
-              <p:sp>
-                <p:nvSpPr>
-                  <p:cNvPr id="2071" name="Line 23"/>
-                  <p:cNvSpPr>
-                    <a:spLocks noChangeShapeType="1"/>
-                  </p:cNvSpPr>
-                  <p:nvPr/>
-                </p:nvSpPr>
-                <p:spPr bwMode="auto">
-                  <a:xfrm flipH="1">
-                    <a:off x="2297" y="2070"/>
-                    <a:ext cx="228" cy="252"/>
-                  </a:xfrm>
-                  <a:prstGeom prst="line">
-                    <a:avLst/>
-                  </a:prstGeom>
-                  <a:noFill/>
-                  <a:ln w="9360">
-                    <a:solidFill>
-                      <a:srgbClr val="000000"/>
-                    </a:solidFill>
-                    <a:round/>
-                    <a:headEnd/>
-                    <a:tailEnd/>
-                  </a:ln>
-                  <a:effectLst/>
-                </p:spPr>
-                <p:txBody>
-                  <a:bodyPr vert="horz" wrap="square" lIns="91440" tIns="45720" rIns="91440" bIns="45720" numCol="1" anchor="t" anchorCtr="0" compatLnSpc="1">
-                    <a:prstTxWarp prst="textNoShape">
-                      <a:avLst/>
-                    </a:prstTxWarp>
-                  </a:bodyPr>
-                  <a:lstStyle/>
-                  <a:p>
-                    <a:endParaRPr lang="en-CA"/>
-                  </a:p>
-                </p:txBody>
-              </p:sp>
-              <p:sp>
-                <p:nvSpPr>
-                  <p:cNvPr id="2072" name="Line 24"/>
-                  <p:cNvSpPr>
-                    <a:spLocks noChangeShapeType="1"/>
-                  </p:cNvSpPr>
-                  <p:nvPr/>
-                </p:nvSpPr>
-                <p:spPr bwMode="auto">
-                  <a:xfrm>
-                    <a:off x="2527" y="2070"/>
-                    <a:ext cx="216" cy="252"/>
-                  </a:xfrm>
-                  <a:prstGeom prst="line">
-                    <a:avLst/>
-                  </a:prstGeom>
-                  <a:noFill/>
-                  <a:ln w="9360">
-                    <a:solidFill>
-                      <a:srgbClr val="000000"/>
-                    </a:solidFill>
-                    <a:round/>
-                    <a:headEnd/>
-                    <a:tailEnd/>
-                  </a:ln>
-                  <a:effectLst/>
-                </p:spPr>
-                <p:txBody>
-                  <a:bodyPr vert="horz" wrap="square" lIns="91440" tIns="45720" rIns="91440" bIns="45720" numCol="1" anchor="t" anchorCtr="0" compatLnSpc="1">
-                    <a:prstTxWarp prst="textNoShape">
-                      <a:avLst/>
-                    </a:prstTxWarp>
-                  </a:bodyPr>
-                  <a:lstStyle/>
-                  <a:p>
-                    <a:endParaRPr lang="en-CA"/>
-                  </a:p>
-                </p:txBody>
-              </p:sp>
-            </p:grpSp>
-            <p:sp>
-              <p:nvSpPr>
-                <p:cNvPr id="2073" name="Text Box 25"/>
-                <p:cNvSpPr txBox="1">
-                  <a:spLocks noChangeArrowheads="1"/>
-                </p:cNvSpPr>
-                <p:nvPr/>
-              </p:nvSpPr>
-              <p:spPr bwMode="auto">
-                <a:xfrm>
-                  <a:off x="1630" y="2348"/>
-                  <a:ext cx="1791" cy="355"/>
-                </a:xfrm>
-                <a:prstGeom prst="rect">
-                  <a:avLst/>
-                </a:prstGeom>
-                <a:noFill/>
-                <a:ln w="9525">
-                  <a:noFill/>
-                  <a:round/>
-                  <a:headEnd/>
-                  <a:tailEnd/>
-                </a:ln>
-                <a:effectLst/>
-              </p:spPr>
-              <p:txBody>
-                <a:bodyPr vert="horz" wrap="square" lIns="0" tIns="0" rIns="0" bIns="0" numCol="1" anchor="t" anchorCtr="0" compatLnSpc="1">
-                  <a:prstTxWarp prst="textNoShape">
-                    <a:avLst/>
-                  </a:prstTxWarp>
-                </a:bodyPr>
-                <a:lstStyle/>
-                <a:p>
-                  <a:pPr marL="0" marR="0" lvl="0" indent="0" algn="ctr" defTabSz="914400" rtl="0" eaLnBrk="1" fontAlgn="base" latinLnBrk="0" hangingPunct="1">
-                    <a:lnSpc>
-                      <a:spcPct val="100000"/>
-                    </a:lnSpc>
-                    <a:spcBef>
-                      <a:spcPct val="0"/>
-                    </a:spcBef>
-                    <a:spcAft>
-                      <a:spcPts val="1000"/>
-                    </a:spcAft>
-                    <a:buClrTx/>
-                    <a:buSzTx/>
-                    <a:buFontTx/>
-                    <a:buNone/>
-                    <a:tabLst/>
-                  </a:pPr>
-                  <a:r>
-                    <a:rPr kumimoji="0" lang="en-CA" sz="1200" b="0" i="0" u="none" strike="noStrike" cap="none" normalizeH="0" baseline="0" smtClean="0">
-                      <a:ln>
-                        <a:noFill/>
-                      </a:ln>
-                      <a:solidFill>
-                        <a:schemeClr val="tx1"/>
-                      </a:solidFill>
-                      <a:effectLst/>
-                      <a:latin typeface="Times New Roman" pitchFamily="18" charset="0"/>
-                      <a:cs typeface="Arial" pitchFamily="34" charset="0"/>
-                    </a:rPr>
-                    <a:t>Organization</a:t>
-                  </a:r>
-                  <a:endParaRPr kumimoji="0" lang="en-US" sz="1800" b="0" i="0" u="none" strike="noStrike" cap="none" normalizeH="0" baseline="0" smtClean="0">
-                    <a:ln>
-                      <a:noFill/>
-                    </a:ln>
-                    <a:solidFill>
-                      <a:schemeClr val="tx1"/>
-                    </a:solidFill>
-                    <a:effectLst/>
-                    <a:latin typeface="Arial" pitchFamily="34" charset="0"/>
-                    <a:cs typeface="Arial" pitchFamily="34" charset="0"/>
-                  </a:endParaRPr>
-                </a:p>
-              </p:txBody>
-            </p:sp>
-          </p:grpSp>
-          <p:grpSp>
-            <p:nvGrpSpPr>
-              <p:cNvPr id="2074" name="Group 26"/>
-              <p:cNvGrpSpPr>
-                <a:grpSpLocks/>
-              </p:cNvGrpSpPr>
-              <p:nvPr/>
-            </p:nvGrpSpPr>
-            <p:grpSpPr bwMode="auto">
-              <a:xfrm>
-                <a:off x="1602" y="5476"/>
-                <a:ext cx="1791" cy="1371"/>
-                <a:chOff x="1602" y="5476"/>
-                <a:chExt cx="1791" cy="1371"/>
-              </a:xfrm>
-            </p:grpSpPr>
-            <p:grpSp>
-              <p:nvGrpSpPr>
-                <p:cNvPr id="2075" name="Group 27"/>
-                <p:cNvGrpSpPr>
-                  <a:grpSpLocks/>
-                </p:cNvGrpSpPr>
-                <p:nvPr/>
-              </p:nvGrpSpPr>
-              <p:grpSpPr bwMode="auto">
-                <a:xfrm>
-                  <a:off x="2243" y="5476"/>
-                  <a:ext cx="471" cy="991"/>
-                  <a:chOff x="2243" y="5476"/>
-                  <a:chExt cx="471" cy="991"/>
-                </a:xfrm>
-              </p:grpSpPr>
-              <p:sp>
-                <p:nvSpPr>
-                  <p:cNvPr id="2076" name="Oval 28"/>
-                  <p:cNvSpPr>
-                    <a:spLocks noChangeArrowheads="1"/>
-                  </p:cNvSpPr>
-                  <p:nvPr/>
-                </p:nvSpPr>
-                <p:spPr bwMode="auto">
-                  <a:xfrm>
-                    <a:off x="2384" y="5476"/>
-                    <a:ext cx="241" cy="230"/>
-                  </a:xfrm>
-                  <a:prstGeom prst="ellipse">
-                    <a:avLst/>
-                  </a:prstGeom>
-                  <a:noFill/>
-                  <a:ln w="9360">
-                    <a:solidFill>
-                      <a:srgbClr val="000000"/>
-                    </a:solidFill>
-                    <a:round/>
-                    <a:headEnd/>
-                    <a:tailEnd/>
-                  </a:ln>
-                  <a:effectLst/>
-                </p:spPr>
-                <p:txBody>
-                  <a:bodyPr vert="horz" wrap="none" lIns="91440" tIns="45720" rIns="91440" bIns="45720" numCol="1" anchor="ctr" anchorCtr="0" compatLnSpc="1">
-                    <a:prstTxWarp prst="textNoShape">
-                      <a:avLst/>
-                    </a:prstTxWarp>
-                  </a:bodyPr>
-                  <a:lstStyle/>
-                  <a:p>
-                    <a:endParaRPr lang="en-CA"/>
-                  </a:p>
-                </p:txBody>
-              </p:sp>
-              <p:sp>
-                <p:nvSpPr>
-                  <p:cNvPr id="2077" name="Line 29"/>
-                  <p:cNvSpPr>
-                    <a:spLocks noChangeShapeType="1"/>
-                  </p:cNvSpPr>
-                  <p:nvPr/>
-                </p:nvSpPr>
-                <p:spPr bwMode="auto">
-                  <a:xfrm flipV="1">
-                    <a:off x="2499" y="5706"/>
-                    <a:ext cx="0" cy="505"/>
-                  </a:xfrm>
-                  <a:prstGeom prst="line">
-                    <a:avLst/>
-                  </a:prstGeom>
-                  <a:noFill/>
-                  <a:ln w="9360">
-                    <a:solidFill>
-                      <a:srgbClr val="000000"/>
-                    </a:solidFill>
-                    <a:round/>
-                    <a:headEnd/>
-                    <a:tailEnd/>
-                  </a:ln>
-                  <a:effectLst/>
-                </p:spPr>
-                <p:txBody>
-                  <a:bodyPr vert="horz" wrap="square" lIns="91440" tIns="45720" rIns="91440" bIns="45720" numCol="1" anchor="t" anchorCtr="0" compatLnSpc="1">
-                    <a:prstTxWarp prst="textNoShape">
-                      <a:avLst/>
-                    </a:prstTxWarp>
-                  </a:bodyPr>
-                  <a:lstStyle/>
-                  <a:p>
-                    <a:endParaRPr lang="en-CA"/>
-                  </a:p>
-                </p:txBody>
-              </p:sp>
-              <p:sp>
-                <p:nvSpPr>
-                  <p:cNvPr id="2078" name="Line 30"/>
-                  <p:cNvSpPr>
-                    <a:spLocks noChangeShapeType="1"/>
-                  </p:cNvSpPr>
-                  <p:nvPr/>
-                </p:nvSpPr>
-                <p:spPr bwMode="auto">
-                  <a:xfrm>
-                    <a:off x="2243" y="5822"/>
-                    <a:ext cx="471" cy="0"/>
-                  </a:xfrm>
-                  <a:prstGeom prst="line">
-                    <a:avLst/>
-                  </a:prstGeom>
-                  <a:noFill/>
-                  <a:ln w="9360">
-                    <a:solidFill>
-                      <a:srgbClr val="000000"/>
-                    </a:solidFill>
-                    <a:round/>
-                    <a:headEnd/>
-                    <a:tailEnd/>
-                  </a:ln>
-                  <a:effectLst/>
-                </p:spPr>
-                <p:txBody>
-                  <a:bodyPr vert="horz" wrap="square" lIns="91440" tIns="45720" rIns="91440" bIns="45720" numCol="1" anchor="t" anchorCtr="0" compatLnSpc="1">
-                    <a:prstTxWarp prst="textNoShape">
-                      <a:avLst/>
-                    </a:prstTxWarp>
-                  </a:bodyPr>
-                  <a:lstStyle/>
-                  <a:p>
-                    <a:endParaRPr lang="en-CA"/>
-                  </a:p>
-                </p:txBody>
-              </p:sp>
-              <p:sp>
-                <p:nvSpPr>
-                  <p:cNvPr id="2079" name="Line 31"/>
-                  <p:cNvSpPr>
-                    <a:spLocks noChangeShapeType="1"/>
-                  </p:cNvSpPr>
-                  <p:nvPr/>
-                </p:nvSpPr>
-                <p:spPr bwMode="auto">
-                  <a:xfrm flipH="1">
-                    <a:off x="2268" y="6214"/>
-                    <a:ext cx="229" cy="253"/>
-                  </a:xfrm>
-                  <a:prstGeom prst="line">
-                    <a:avLst/>
-                  </a:prstGeom>
-                  <a:noFill/>
-                  <a:ln w="9360">
-                    <a:solidFill>
-                      <a:srgbClr val="000000"/>
-                    </a:solidFill>
-                    <a:round/>
-                    <a:headEnd/>
-                    <a:tailEnd/>
-                  </a:ln>
-                  <a:effectLst/>
-                </p:spPr>
-                <p:txBody>
-                  <a:bodyPr vert="horz" wrap="square" lIns="91440" tIns="45720" rIns="91440" bIns="45720" numCol="1" anchor="t" anchorCtr="0" compatLnSpc="1">
-                    <a:prstTxWarp prst="textNoShape">
-                      <a:avLst/>
-                    </a:prstTxWarp>
-                  </a:bodyPr>
-                  <a:lstStyle/>
-                  <a:p>
-                    <a:endParaRPr lang="en-CA"/>
-                  </a:p>
-                </p:txBody>
-              </p:sp>
-              <p:sp>
-                <p:nvSpPr>
-                  <p:cNvPr id="2080" name="Line 32"/>
-                  <p:cNvSpPr>
-                    <a:spLocks noChangeShapeType="1"/>
-                  </p:cNvSpPr>
-                  <p:nvPr/>
-                </p:nvSpPr>
-                <p:spPr bwMode="auto">
-                  <a:xfrm>
-                    <a:off x="2499" y="6214"/>
-                    <a:ext cx="215" cy="253"/>
-                  </a:xfrm>
-                  <a:prstGeom prst="line">
-                    <a:avLst/>
-                  </a:prstGeom>
-                  <a:noFill/>
-                  <a:ln w="9360">
-                    <a:solidFill>
-                      <a:srgbClr val="000000"/>
-                    </a:solidFill>
-                    <a:round/>
-                    <a:headEnd/>
-                    <a:tailEnd/>
-                  </a:ln>
-                  <a:effectLst/>
-                </p:spPr>
-                <p:txBody>
-                  <a:bodyPr vert="horz" wrap="square" lIns="91440" tIns="45720" rIns="91440" bIns="45720" numCol="1" anchor="t" anchorCtr="0" compatLnSpc="1">
-                    <a:prstTxWarp prst="textNoShape">
-                      <a:avLst/>
-                    </a:prstTxWarp>
-                  </a:bodyPr>
-                  <a:lstStyle/>
-                  <a:p>
-                    <a:endParaRPr lang="en-CA"/>
-                  </a:p>
-                </p:txBody>
-              </p:sp>
-            </p:grpSp>
-            <p:sp>
-              <p:nvSpPr>
-                <p:cNvPr id="2081" name="Text Box 33"/>
-                <p:cNvSpPr txBox="1">
-                  <a:spLocks noChangeArrowheads="1"/>
-                </p:cNvSpPr>
-                <p:nvPr/>
-              </p:nvSpPr>
-              <p:spPr bwMode="auto">
-                <a:xfrm>
-                  <a:off x="1602" y="6492"/>
-                  <a:ext cx="1791" cy="355"/>
-                </a:xfrm>
-                <a:prstGeom prst="rect">
-                  <a:avLst/>
-                </a:prstGeom>
-                <a:noFill/>
-                <a:ln w="9525">
-                  <a:noFill/>
-                  <a:round/>
-                  <a:headEnd/>
-                  <a:tailEnd/>
-                </a:ln>
-                <a:effectLst/>
-              </p:spPr>
-              <p:txBody>
-                <a:bodyPr vert="horz" wrap="square" lIns="0" tIns="0" rIns="0" bIns="0" numCol="1" anchor="t" anchorCtr="0" compatLnSpc="1">
-                  <a:prstTxWarp prst="textNoShape">
-                    <a:avLst/>
-                  </a:prstTxWarp>
-                </a:bodyPr>
-                <a:lstStyle/>
-                <a:p>
-                  <a:pPr marL="0" marR="0" lvl="0" indent="0" algn="ctr" defTabSz="914400" rtl="0" eaLnBrk="1" fontAlgn="base" latinLnBrk="0" hangingPunct="1">
-                    <a:lnSpc>
-                      <a:spcPct val="100000"/>
-                    </a:lnSpc>
-                    <a:spcBef>
-                      <a:spcPct val="0"/>
-                    </a:spcBef>
-                    <a:spcAft>
-                      <a:spcPts val="1000"/>
-                    </a:spcAft>
-                    <a:buClrTx/>
-                    <a:buSzTx/>
-                    <a:buFontTx/>
-                    <a:buNone/>
-                    <a:tabLst/>
-                  </a:pPr>
-                  <a:r>
-                    <a:rPr kumimoji="0" lang="en-CA" sz="1200" b="0" i="0" u="none" strike="noStrike" cap="none" normalizeH="0" baseline="0" smtClean="0">
-                      <a:ln>
-                        <a:noFill/>
-                      </a:ln>
-                      <a:solidFill>
-                        <a:schemeClr val="tx1"/>
-                      </a:solidFill>
-                      <a:effectLst/>
-                      <a:latin typeface="Times New Roman" pitchFamily="18" charset="0"/>
-                      <a:cs typeface="Arial" pitchFamily="34" charset="0"/>
-                    </a:rPr>
-                    <a:t>Volunteer</a:t>
-                  </a:r>
-                  <a:endParaRPr kumimoji="0" lang="en-US" sz="1800" b="0" i="0" u="none" strike="noStrike" cap="none" normalizeH="0" baseline="0" smtClean="0">
-                    <a:ln>
-                      <a:noFill/>
-                    </a:ln>
-                    <a:solidFill>
-                      <a:schemeClr val="tx1"/>
-                    </a:solidFill>
-                    <a:effectLst/>
-                    <a:latin typeface="Arial" pitchFamily="34" charset="0"/>
-                    <a:cs typeface="Arial" pitchFamily="34" charset="0"/>
-                  </a:endParaRPr>
-                </a:p>
-              </p:txBody>
-            </p:sp>
-          </p:grpSp>
-          <p:grpSp>
-            <p:nvGrpSpPr>
-              <p:cNvPr id="2082" name="Group 34"/>
-              <p:cNvGrpSpPr>
-                <a:grpSpLocks/>
-              </p:cNvGrpSpPr>
-              <p:nvPr/>
-            </p:nvGrpSpPr>
-            <p:grpSpPr bwMode="auto">
-              <a:xfrm>
-                <a:off x="1560" y="9123"/>
-                <a:ext cx="1791" cy="1370"/>
-                <a:chOff x="1560" y="9123"/>
-                <a:chExt cx="1791" cy="1370"/>
-              </a:xfrm>
-            </p:grpSpPr>
-            <p:grpSp>
-              <p:nvGrpSpPr>
-                <p:cNvPr id="2083" name="Group 35"/>
-                <p:cNvGrpSpPr>
-                  <a:grpSpLocks/>
-                </p:cNvGrpSpPr>
-                <p:nvPr/>
-              </p:nvGrpSpPr>
-              <p:grpSpPr bwMode="auto">
-                <a:xfrm>
-                  <a:off x="2201" y="9123"/>
-                  <a:ext cx="471" cy="990"/>
-                  <a:chOff x="2201" y="9123"/>
-                  <a:chExt cx="471" cy="990"/>
-                </a:xfrm>
-              </p:grpSpPr>
-              <p:sp>
-                <p:nvSpPr>
-                  <p:cNvPr id="2084" name="Oval 36"/>
-                  <p:cNvSpPr>
-                    <a:spLocks noChangeArrowheads="1"/>
-                  </p:cNvSpPr>
-                  <p:nvPr/>
-                </p:nvSpPr>
-                <p:spPr bwMode="auto">
-                  <a:xfrm>
-                    <a:off x="2342" y="9123"/>
-                    <a:ext cx="241" cy="229"/>
-                  </a:xfrm>
-                  <a:prstGeom prst="ellipse">
-                    <a:avLst/>
-                  </a:prstGeom>
-                  <a:noFill/>
-                  <a:ln w="9360">
-                    <a:solidFill>
-                      <a:srgbClr val="000000"/>
-                    </a:solidFill>
-                    <a:round/>
-                    <a:headEnd/>
-                    <a:tailEnd/>
-                  </a:ln>
-                  <a:effectLst/>
-                </p:spPr>
-                <p:txBody>
-                  <a:bodyPr vert="horz" wrap="none" lIns="91440" tIns="45720" rIns="91440" bIns="45720" numCol="1" anchor="ctr" anchorCtr="0" compatLnSpc="1">
-                    <a:prstTxWarp prst="textNoShape">
-                      <a:avLst/>
-                    </a:prstTxWarp>
-                  </a:bodyPr>
-                  <a:lstStyle/>
-                  <a:p>
-                    <a:endParaRPr lang="en-CA"/>
-                  </a:p>
-                </p:txBody>
-              </p:sp>
-              <p:sp>
-                <p:nvSpPr>
-                  <p:cNvPr id="2085" name="Line 37"/>
-                  <p:cNvSpPr>
-                    <a:spLocks noChangeShapeType="1"/>
-                  </p:cNvSpPr>
-                  <p:nvPr/>
-                </p:nvSpPr>
-                <p:spPr bwMode="auto">
-                  <a:xfrm flipV="1">
-                    <a:off x="2457" y="9352"/>
-                    <a:ext cx="0" cy="506"/>
-                  </a:xfrm>
-                  <a:prstGeom prst="line">
-                    <a:avLst/>
-                  </a:prstGeom>
-                  <a:noFill/>
-                  <a:ln w="9360">
-                    <a:solidFill>
-                      <a:srgbClr val="000000"/>
-                    </a:solidFill>
-                    <a:round/>
-                    <a:headEnd/>
-                    <a:tailEnd/>
-                  </a:ln>
-                  <a:effectLst/>
-                </p:spPr>
-                <p:txBody>
-                  <a:bodyPr vert="horz" wrap="square" lIns="91440" tIns="45720" rIns="91440" bIns="45720" numCol="1" anchor="t" anchorCtr="0" compatLnSpc="1">
-                    <a:prstTxWarp prst="textNoShape">
-                      <a:avLst/>
-                    </a:prstTxWarp>
-                  </a:bodyPr>
-                  <a:lstStyle/>
-                  <a:p>
-                    <a:endParaRPr lang="en-CA"/>
-                  </a:p>
-                </p:txBody>
-              </p:sp>
-              <p:sp>
-                <p:nvSpPr>
-                  <p:cNvPr id="2086" name="Line 38"/>
-                  <p:cNvSpPr>
-                    <a:spLocks noChangeShapeType="1"/>
-                  </p:cNvSpPr>
-                  <p:nvPr/>
-                </p:nvSpPr>
-                <p:spPr bwMode="auto">
-                  <a:xfrm>
-                    <a:off x="2201" y="9469"/>
-                    <a:ext cx="471" cy="0"/>
-                  </a:xfrm>
-                  <a:prstGeom prst="line">
-                    <a:avLst/>
-                  </a:prstGeom>
-                  <a:noFill/>
-                  <a:ln w="9360">
-                    <a:solidFill>
-                      <a:srgbClr val="000000"/>
-                    </a:solidFill>
-                    <a:round/>
-                    <a:headEnd/>
-                    <a:tailEnd/>
-                  </a:ln>
-                  <a:effectLst/>
-                </p:spPr>
-                <p:txBody>
-                  <a:bodyPr vert="horz" wrap="square" lIns="91440" tIns="45720" rIns="91440" bIns="45720" numCol="1" anchor="t" anchorCtr="0" compatLnSpc="1">
-                    <a:prstTxWarp prst="textNoShape">
-                      <a:avLst/>
-                    </a:prstTxWarp>
-                  </a:bodyPr>
-                  <a:lstStyle/>
-                  <a:p>
-                    <a:endParaRPr lang="en-CA"/>
-                  </a:p>
-                </p:txBody>
-              </p:sp>
-              <p:sp>
-                <p:nvSpPr>
-                  <p:cNvPr id="2087" name="Line 39"/>
-                  <p:cNvSpPr>
-                    <a:spLocks noChangeShapeType="1"/>
-                  </p:cNvSpPr>
-                  <p:nvPr/>
-                </p:nvSpPr>
-                <p:spPr bwMode="auto">
-                  <a:xfrm flipH="1">
-                    <a:off x="2226" y="9860"/>
-                    <a:ext cx="229" cy="253"/>
-                  </a:xfrm>
-                  <a:prstGeom prst="line">
-                    <a:avLst/>
-                  </a:prstGeom>
-                  <a:noFill/>
-                  <a:ln w="9360">
-                    <a:solidFill>
-                      <a:srgbClr val="000000"/>
-                    </a:solidFill>
-                    <a:round/>
-                    <a:headEnd/>
-                    <a:tailEnd/>
-                  </a:ln>
-                  <a:effectLst/>
-                </p:spPr>
-                <p:txBody>
-                  <a:bodyPr vert="horz" wrap="square" lIns="91440" tIns="45720" rIns="91440" bIns="45720" numCol="1" anchor="t" anchorCtr="0" compatLnSpc="1">
-                    <a:prstTxWarp prst="textNoShape">
-                      <a:avLst/>
-                    </a:prstTxWarp>
-                  </a:bodyPr>
-                  <a:lstStyle/>
-                  <a:p>
-                    <a:endParaRPr lang="en-CA"/>
-                  </a:p>
-                </p:txBody>
-              </p:sp>
-              <p:sp>
-                <p:nvSpPr>
-                  <p:cNvPr id="2088" name="Line 40"/>
-                  <p:cNvSpPr>
-                    <a:spLocks noChangeShapeType="1"/>
-                  </p:cNvSpPr>
-                  <p:nvPr/>
-                </p:nvSpPr>
-                <p:spPr bwMode="auto">
-                  <a:xfrm>
-                    <a:off x="2457" y="9860"/>
-                    <a:ext cx="215" cy="253"/>
-                  </a:xfrm>
-                  <a:prstGeom prst="line">
-                    <a:avLst/>
-                  </a:prstGeom>
-                  <a:noFill/>
-                  <a:ln w="9360">
-                    <a:solidFill>
-                      <a:srgbClr val="000000"/>
-                    </a:solidFill>
-                    <a:round/>
-                    <a:headEnd/>
-                    <a:tailEnd/>
-                  </a:ln>
-                  <a:effectLst/>
-                </p:spPr>
-                <p:txBody>
-                  <a:bodyPr vert="horz" wrap="square" lIns="91440" tIns="45720" rIns="91440" bIns="45720" numCol="1" anchor="t" anchorCtr="0" compatLnSpc="1">
-                    <a:prstTxWarp prst="textNoShape">
-                      <a:avLst/>
-                    </a:prstTxWarp>
-                  </a:bodyPr>
-                  <a:lstStyle/>
-                  <a:p>
-                    <a:endParaRPr lang="en-CA"/>
-                  </a:p>
-                </p:txBody>
-              </p:sp>
-            </p:grpSp>
-            <p:sp>
-              <p:nvSpPr>
-                <p:cNvPr id="2089" name="Text Box 41"/>
-                <p:cNvSpPr txBox="1">
-                  <a:spLocks noChangeArrowheads="1"/>
-                </p:cNvSpPr>
-                <p:nvPr/>
-              </p:nvSpPr>
-              <p:spPr bwMode="auto">
-                <a:xfrm>
-                  <a:off x="1560" y="10138"/>
-                  <a:ext cx="1791" cy="355"/>
-                </a:xfrm>
-                <a:prstGeom prst="rect">
-                  <a:avLst/>
-                </a:prstGeom>
-                <a:noFill/>
-                <a:ln w="9525">
-                  <a:noFill/>
-                  <a:round/>
-                  <a:headEnd/>
-                  <a:tailEnd/>
-                </a:ln>
-                <a:effectLst/>
-              </p:spPr>
-              <p:txBody>
-                <a:bodyPr vert="horz" wrap="square" lIns="0" tIns="0" rIns="0" bIns="0" numCol="1" anchor="t" anchorCtr="0" compatLnSpc="1">
-                  <a:prstTxWarp prst="textNoShape">
-                    <a:avLst/>
-                  </a:prstTxWarp>
-                </a:bodyPr>
-                <a:lstStyle/>
-                <a:p>
-                  <a:pPr marL="0" marR="0" lvl="0" indent="0" algn="ctr" defTabSz="914400" rtl="0" eaLnBrk="1" fontAlgn="base" latinLnBrk="0" hangingPunct="1">
-                    <a:lnSpc>
-                      <a:spcPct val="100000"/>
-                    </a:lnSpc>
-                    <a:spcBef>
-                      <a:spcPct val="0"/>
-                    </a:spcBef>
-                    <a:spcAft>
-                      <a:spcPts val="1000"/>
-                    </a:spcAft>
-                    <a:buClrTx/>
-                    <a:buSzTx/>
-                    <a:buFontTx/>
-                    <a:buNone/>
-                    <a:tabLst/>
-                  </a:pPr>
-                  <a:r>
-                    <a:rPr kumimoji="0" lang="en-CA" sz="1200" b="0" i="0" u="none" strike="noStrike" cap="none" normalizeH="0" baseline="0" smtClean="0">
-                      <a:ln>
-                        <a:noFill/>
-                      </a:ln>
-                      <a:solidFill>
-                        <a:schemeClr val="tx1"/>
-                      </a:solidFill>
-                      <a:effectLst/>
-                      <a:latin typeface="Times New Roman" pitchFamily="18" charset="0"/>
-                      <a:cs typeface="Arial" pitchFamily="34" charset="0"/>
-                    </a:rPr>
-                    <a:t>Site Admin</a:t>
-                  </a:r>
-                  <a:endParaRPr kumimoji="0" lang="en-US" sz="1800" b="0" i="0" u="none" strike="noStrike" cap="none" normalizeH="0" baseline="0" smtClean="0">
-                    <a:ln>
-                      <a:noFill/>
-                    </a:ln>
-                    <a:solidFill>
-                      <a:schemeClr val="tx1"/>
-                    </a:solidFill>
-                    <a:effectLst/>
-                    <a:latin typeface="Arial" pitchFamily="34" charset="0"/>
-                    <a:cs typeface="Arial" pitchFamily="34" charset="0"/>
-                  </a:endParaRPr>
-                </a:p>
-              </p:txBody>
-            </p:sp>
-          </p:grpSp>
-          <p:grpSp>
-            <p:nvGrpSpPr>
-              <p:cNvPr id="2090" name="Group 42"/>
-              <p:cNvGrpSpPr>
-                <a:grpSpLocks/>
-              </p:cNvGrpSpPr>
-              <p:nvPr/>
-            </p:nvGrpSpPr>
-            <p:grpSpPr bwMode="auto">
-              <a:xfrm>
-                <a:off x="5042" y="2534"/>
-                <a:ext cx="3186" cy="748"/>
-                <a:chOff x="5042" y="2534"/>
-                <a:chExt cx="3186" cy="748"/>
-              </a:xfrm>
-            </p:grpSpPr>
-            <p:sp>
-              <p:nvSpPr>
-                <p:cNvPr id="2091" name="Oval 43"/>
-                <p:cNvSpPr>
-                  <a:spLocks noChangeArrowheads="1"/>
-                </p:cNvSpPr>
-                <p:nvPr/>
-              </p:nvSpPr>
-              <p:spPr bwMode="auto">
-                <a:xfrm>
-                  <a:off x="5042" y="2534"/>
-                  <a:ext cx="3186" cy="748"/>
-                </a:xfrm>
-                <a:prstGeom prst="ellipse">
-                  <a:avLst/>
-                </a:prstGeom>
-                <a:noFill/>
-                <a:ln w="9360">
-                  <a:solidFill>
-                    <a:srgbClr val="000000"/>
-                  </a:solidFill>
-                  <a:round/>
-                  <a:headEnd/>
-                  <a:tailEnd/>
-                </a:ln>
-                <a:effectLst/>
-              </p:spPr>
-              <p:txBody>
-                <a:bodyPr vert="horz" wrap="none" lIns="91440" tIns="45720" rIns="91440" bIns="45720" numCol="1" anchor="ctr" anchorCtr="0" compatLnSpc="1">
-                  <a:prstTxWarp prst="textNoShape">
-                    <a:avLst/>
-                  </a:prstTxWarp>
-                </a:bodyPr>
-                <a:lstStyle/>
-                <a:p>
-                  <a:endParaRPr lang="en-CA"/>
-                </a:p>
-              </p:txBody>
-            </p:sp>
-            <p:sp>
-              <p:nvSpPr>
-                <p:cNvPr id="2092" name="Text Box 44"/>
-                <p:cNvSpPr txBox="1">
-                  <a:spLocks noChangeArrowheads="1"/>
-                </p:cNvSpPr>
-                <p:nvPr/>
-              </p:nvSpPr>
-              <p:spPr bwMode="auto">
-                <a:xfrm>
-                  <a:off x="5298" y="2701"/>
-                  <a:ext cx="2687" cy="467"/>
-                </a:xfrm>
-                <a:prstGeom prst="rect">
-                  <a:avLst/>
-                </a:prstGeom>
-                <a:noFill/>
-                <a:ln w="9525">
-                  <a:noFill/>
-                  <a:round/>
-                  <a:headEnd/>
-                  <a:tailEnd/>
-                </a:ln>
-                <a:effectLst/>
-              </p:spPr>
-              <p:txBody>
-                <a:bodyPr vert="horz" wrap="square" lIns="0" tIns="0" rIns="0" bIns="0" numCol="1" anchor="t" anchorCtr="0" compatLnSpc="1">
-                  <a:prstTxWarp prst="textNoShape">
-                    <a:avLst/>
-                  </a:prstTxWarp>
-                </a:bodyPr>
-                <a:lstStyle/>
-                <a:p>
-                  <a:pPr marL="0" marR="0" lvl="0" indent="0" algn="ctr" defTabSz="914400" rtl="0" eaLnBrk="1" fontAlgn="base" latinLnBrk="0" hangingPunct="1">
-                    <a:lnSpc>
-                      <a:spcPct val="100000"/>
-                    </a:lnSpc>
-                    <a:spcBef>
-                      <a:spcPct val="0"/>
-                    </a:spcBef>
-                    <a:spcAft>
-                      <a:spcPts val="1000"/>
-                    </a:spcAft>
-                    <a:buClrTx/>
-                    <a:buSzTx/>
-                    <a:buFontTx/>
-                    <a:buNone/>
-                    <a:tabLst/>
-                  </a:pPr>
-                  <a:r>
-                    <a:rPr kumimoji="0" lang="en-CA" sz="1200" b="0" i="0" u="none" strike="noStrike" cap="none" normalizeH="0" baseline="0" smtClean="0">
-                      <a:ln>
-                        <a:noFill/>
-                      </a:ln>
-                      <a:solidFill>
-                        <a:schemeClr val="tx1"/>
-                      </a:solidFill>
-                      <a:effectLst/>
-                      <a:latin typeface="Times New Roman" pitchFamily="18" charset="0"/>
-                      <a:cs typeface="Arial" pitchFamily="34" charset="0"/>
-                    </a:rPr>
-                    <a:t>Schedule Volunteers &amp; Track Work</a:t>
-                  </a:r>
-                  <a:endParaRPr kumimoji="0" lang="en-US" sz="1800" b="0" i="0" u="none" strike="noStrike" cap="none" normalizeH="0" baseline="0" smtClean="0">
-                    <a:ln>
-                      <a:noFill/>
-                    </a:ln>
-                    <a:solidFill>
-                      <a:schemeClr val="tx1"/>
-                    </a:solidFill>
-                    <a:effectLst/>
-                    <a:latin typeface="Arial" pitchFamily="34" charset="0"/>
-                    <a:cs typeface="Arial" pitchFamily="34" charset="0"/>
-                  </a:endParaRPr>
-                </a:p>
-              </p:txBody>
-            </p:sp>
-          </p:grpSp>
-          <p:grpSp>
-            <p:nvGrpSpPr>
-              <p:cNvPr id="2093" name="Group 45"/>
-              <p:cNvGrpSpPr>
-                <a:grpSpLocks/>
-              </p:cNvGrpSpPr>
-              <p:nvPr/>
-            </p:nvGrpSpPr>
-            <p:grpSpPr bwMode="auto">
-              <a:xfrm>
-                <a:off x="5106" y="3445"/>
-                <a:ext cx="3186" cy="746"/>
-                <a:chOff x="5106" y="3445"/>
-                <a:chExt cx="3186" cy="746"/>
-              </a:xfrm>
-            </p:grpSpPr>
-            <p:sp>
-              <p:nvSpPr>
-                <p:cNvPr id="2094" name="Oval 46"/>
-                <p:cNvSpPr>
-                  <a:spLocks noChangeArrowheads="1"/>
-                </p:cNvSpPr>
-                <p:nvPr/>
-              </p:nvSpPr>
-              <p:spPr bwMode="auto">
-                <a:xfrm>
-                  <a:off x="5106" y="3445"/>
-                  <a:ext cx="3186" cy="746"/>
-                </a:xfrm>
-                <a:prstGeom prst="ellipse">
-                  <a:avLst/>
-                </a:prstGeom>
-                <a:noFill/>
-                <a:ln w="9360">
-                  <a:solidFill>
-                    <a:srgbClr val="000000"/>
-                  </a:solidFill>
-                  <a:round/>
-                  <a:headEnd/>
-                  <a:tailEnd/>
-                </a:ln>
-                <a:effectLst/>
-              </p:spPr>
-              <p:txBody>
-                <a:bodyPr vert="horz" wrap="none" lIns="91440" tIns="45720" rIns="91440" bIns="45720" numCol="1" anchor="ctr" anchorCtr="0" compatLnSpc="1">
-                  <a:prstTxWarp prst="textNoShape">
-                    <a:avLst/>
-                  </a:prstTxWarp>
-                </a:bodyPr>
-                <a:lstStyle/>
-                <a:p>
-                  <a:endParaRPr lang="en-CA"/>
-                </a:p>
-              </p:txBody>
-            </p:sp>
-            <p:sp>
-              <p:nvSpPr>
-                <p:cNvPr id="2095" name="Text Box 47"/>
-                <p:cNvSpPr txBox="1">
-                  <a:spLocks noChangeArrowheads="1"/>
-                </p:cNvSpPr>
-                <p:nvPr/>
-              </p:nvSpPr>
-              <p:spPr bwMode="auto">
-                <a:xfrm>
-                  <a:off x="5362" y="3611"/>
-                  <a:ext cx="2687" cy="504"/>
-                </a:xfrm>
-                <a:prstGeom prst="rect">
-                  <a:avLst/>
-                </a:prstGeom>
-                <a:noFill/>
-                <a:ln w="9525">
-                  <a:noFill/>
-                  <a:round/>
-                  <a:headEnd/>
-                  <a:tailEnd/>
-                </a:ln>
-                <a:effectLst/>
-              </p:spPr>
-              <p:txBody>
-                <a:bodyPr vert="horz" wrap="square" lIns="0" tIns="0" rIns="0" bIns="0" numCol="1" anchor="t" anchorCtr="0" compatLnSpc="1">
-                  <a:prstTxWarp prst="textNoShape">
-                    <a:avLst/>
-                  </a:prstTxWarp>
-                </a:bodyPr>
-                <a:lstStyle/>
-                <a:p>
-                  <a:pPr marL="0" marR="0" lvl="0" indent="0" algn="ctr" defTabSz="914400" rtl="0" eaLnBrk="1" fontAlgn="base" latinLnBrk="0" hangingPunct="1">
-                    <a:lnSpc>
-                      <a:spcPct val="100000"/>
-                    </a:lnSpc>
-                    <a:spcBef>
-                      <a:spcPct val="0"/>
-                    </a:spcBef>
-                    <a:spcAft>
-                      <a:spcPts val="1000"/>
-                    </a:spcAft>
-                    <a:buClrTx/>
-                    <a:buSzTx/>
-                    <a:buFontTx/>
-                    <a:buNone/>
-                    <a:tabLst/>
-                  </a:pPr>
-                  <a:r>
-                    <a:rPr kumimoji="0" lang="en-CA" sz="1200" b="0" i="0" u="none" strike="noStrike" cap="none" normalizeH="0" baseline="0" smtClean="0">
-                      <a:ln>
-                        <a:noFill/>
-                      </a:ln>
-                      <a:solidFill>
-                        <a:schemeClr val="tx1"/>
-                      </a:solidFill>
-                      <a:effectLst/>
-                      <a:latin typeface="Times New Roman" pitchFamily="18" charset="0"/>
-                      <a:cs typeface="Arial" pitchFamily="34" charset="0"/>
-                    </a:rPr>
-                    <a:t>Manage organization data and log ins</a:t>
-                  </a:r>
-                </a:p>
-                <a:p>
-                  <a:pPr marL="0" marR="0" lvl="0" indent="0" algn="l" defTabSz="914400" rtl="0" eaLnBrk="1" fontAlgn="base" latinLnBrk="0" hangingPunct="1">
-                    <a:lnSpc>
-                      <a:spcPct val="100000"/>
-                    </a:lnSpc>
-                    <a:spcBef>
-                      <a:spcPct val="0"/>
-                    </a:spcBef>
-                    <a:spcAft>
-                      <a:spcPct val="0"/>
-                    </a:spcAft>
-                    <a:buClrTx/>
-                    <a:buSzTx/>
-                    <a:buFontTx/>
-                    <a:buNone/>
-                    <a:tabLst/>
-                  </a:pPr>
-                  <a:endParaRPr kumimoji="0" lang="en-US" sz="1800" b="0" i="0" u="none" strike="noStrike" cap="none" normalizeH="0" baseline="0" smtClean="0">
-                    <a:ln>
-                      <a:noFill/>
-                    </a:ln>
-                    <a:solidFill>
-                      <a:schemeClr val="tx1"/>
-                    </a:solidFill>
-                    <a:effectLst/>
-                    <a:latin typeface="Arial" pitchFamily="34" charset="0"/>
-                    <a:cs typeface="Arial" pitchFamily="34" charset="0"/>
-                  </a:endParaRPr>
-                </a:p>
-              </p:txBody>
-            </p:sp>
-          </p:grpSp>
-          <p:grpSp>
-            <p:nvGrpSpPr>
-              <p:cNvPr id="2096" name="Group 48"/>
-              <p:cNvGrpSpPr>
-                <a:grpSpLocks/>
-              </p:cNvGrpSpPr>
-              <p:nvPr/>
-            </p:nvGrpSpPr>
-            <p:grpSpPr bwMode="auto">
-              <a:xfrm>
-                <a:off x="5022" y="6953"/>
-                <a:ext cx="3186" cy="768"/>
-                <a:chOff x="5022" y="6953"/>
-                <a:chExt cx="3186" cy="768"/>
-              </a:xfrm>
-            </p:grpSpPr>
-            <p:sp>
-              <p:nvSpPr>
-                <p:cNvPr id="2097" name="Oval 49"/>
-                <p:cNvSpPr>
-                  <a:spLocks noChangeArrowheads="1"/>
-                </p:cNvSpPr>
-                <p:nvPr/>
-              </p:nvSpPr>
-              <p:spPr bwMode="auto">
-                <a:xfrm>
-                  <a:off x="5022" y="6953"/>
-                  <a:ext cx="3186" cy="768"/>
-                </a:xfrm>
-                <a:prstGeom prst="ellipse">
-                  <a:avLst/>
-                </a:prstGeom>
-                <a:noFill/>
-                <a:ln w="9360">
-                  <a:solidFill>
-                    <a:srgbClr val="000000"/>
-                  </a:solidFill>
-                  <a:round/>
-                  <a:headEnd/>
-                  <a:tailEnd/>
-                </a:ln>
-                <a:effectLst/>
-              </p:spPr>
-              <p:txBody>
-                <a:bodyPr vert="horz" wrap="none" lIns="91440" tIns="45720" rIns="91440" bIns="45720" numCol="1" anchor="ctr" anchorCtr="0" compatLnSpc="1">
-                  <a:prstTxWarp prst="textNoShape">
-                    <a:avLst/>
-                  </a:prstTxWarp>
-                </a:bodyPr>
-                <a:lstStyle/>
-                <a:p>
-                  <a:endParaRPr lang="en-CA"/>
-                </a:p>
-              </p:txBody>
-            </p:sp>
-            <p:sp>
-              <p:nvSpPr>
-                <p:cNvPr id="2098" name="Text Box 50"/>
-                <p:cNvSpPr txBox="1">
-                  <a:spLocks noChangeArrowheads="1"/>
-                </p:cNvSpPr>
-                <p:nvPr/>
-              </p:nvSpPr>
-              <p:spPr bwMode="auto">
-                <a:xfrm>
-                  <a:off x="5278" y="7122"/>
-                  <a:ext cx="2687" cy="415"/>
-                </a:xfrm>
-                <a:prstGeom prst="rect">
-                  <a:avLst/>
-                </a:prstGeom>
-                <a:noFill/>
-                <a:ln w="9525">
-                  <a:noFill/>
-                  <a:round/>
-                  <a:headEnd/>
-                  <a:tailEnd/>
-                </a:ln>
-                <a:effectLst/>
-              </p:spPr>
-              <p:txBody>
-                <a:bodyPr vert="horz" wrap="square" lIns="0" tIns="0" rIns="0" bIns="0" numCol="1" anchor="t" anchorCtr="0" compatLnSpc="1">
-                  <a:prstTxWarp prst="textNoShape">
-                    <a:avLst/>
-                  </a:prstTxWarp>
-                </a:bodyPr>
-                <a:lstStyle/>
-                <a:p>
-                  <a:pPr marL="0" marR="0" lvl="0" indent="0" algn="ctr" defTabSz="914400" rtl="0" eaLnBrk="1" fontAlgn="base" latinLnBrk="0" hangingPunct="1">
-                    <a:lnSpc>
-                      <a:spcPct val="100000"/>
-                    </a:lnSpc>
-                    <a:spcBef>
-                      <a:spcPct val="0"/>
-                    </a:spcBef>
-                    <a:spcAft>
-                      <a:spcPts val="1000"/>
-                    </a:spcAft>
-                    <a:buClrTx/>
-                    <a:buSzTx/>
-                    <a:buFontTx/>
-                    <a:buNone/>
-                    <a:tabLst/>
-                  </a:pPr>
-                  <a:r>
-                    <a:rPr kumimoji="0" lang="en-CA" sz="1200" b="0" i="0" u="none" strike="noStrike" cap="none" normalizeH="0" baseline="0" smtClean="0">
-                      <a:ln>
-                        <a:noFill/>
-                      </a:ln>
-                      <a:solidFill>
-                        <a:schemeClr val="tx1"/>
-                      </a:solidFill>
-                      <a:effectLst/>
-                      <a:latin typeface="Times New Roman" pitchFamily="18" charset="0"/>
-                      <a:cs typeface="Arial" pitchFamily="34" charset="0"/>
-                    </a:rPr>
-                    <a:t>View / Print Schedule and Hours Worked</a:t>
-                  </a:r>
-                  <a:endParaRPr kumimoji="0" lang="en-US" sz="1800" b="0" i="0" u="none" strike="noStrike" cap="none" normalizeH="0" baseline="0" smtClean="0">
-                    <a:ln>
-                      <a:noFill/>
-                    </a:ln>
-                    <a:solidFill>
-                      <a:schemeClr val="tx1"/>
-                    </a:solidFill>
-                    <a:effectLst/>
-                    <a:latin typeface="Arial" pitchFamily="34" charset="0"/>
-                    <a:cs typeface="Arial" pitchFamily="34" charset="0"/>
-                  </a:endParaRPr>
-                </a:p>
-              </p:txBody>
-            </p:sp>
-          </p:grpSp>
-          <p:grpSp>
-            <p:nvGrpSpPr>
-              <p:cNvPr id="2099" name="Group 51"/>
-              <p:cNvGrpSpPr>
-                <a:grpSpLocks/>
-              </p:cNvGrpSpPr>
-              <p:nvPr/>
-            </p:nvGrpSpPr>
-            <p:grpSpPr bwMode="auto">
-              <a:xfrm>
-                <a:off x="5028" y="8190"/>
-                <a:ext cx="3186" cy="940"/>
-                <a:chOff x="5028" y="8190"/>
-                <a:chExt cx="3186" cy="940"/>
-              </a:xfrm>
-            </p:grpSpPr>
-            <p:sp>
-              <p:nvSpPr>
-                <p:cNvPr id="2100" name="Oval 52"/>
-                <p:cNvSpPr>
-                  <a:spLocks noChangeArrowheads="1"/>
-                </p:cNvSpPr>
-                <p:nvPr/>
-              </p:nvSpPr>
-              <p:spPr bwMode="auto">
-                <a:xfrm>
-                  <a:off x="5028" y="8190"/>
-                  <a:ext cx="3186" cy="940"/>
-                </a:xfrm>
-                <a:prstGeom prst="ellipse">
-                  <a:avLst/>
-                </a:prstGeom>
-                <a:noFill/>
-                <a:ln w="9360">
-                  <a:solidFill>
-                    <a:srgbClr val="000000"/>
-                  </a:solidFill>
-                  <a:round/>
-                  <a:headEnd/>
-                  <a:tailEnd/>
-                </a:ln>
-                <a:effectLst/>
-              </p:spPr>
-              <p:txBody>
-                <a:bodyPr vert="horz" wrap="none" lIns="91440" tIns="45720" rIns="91440" bIns="45720" numCol="1" anchor="ctr" anchorCtr="0" compatLnSpc="1">
-                  <a:prstTxWarp prst="textNoShape">
-                    <a:avLst/>
-                  </a:prstTxWarp>
-                </a:bodyPr>
-                <a:lstStyle/>
-                <a:p>
-                  <a:endParaRPr lang="en-CA"/>
-                </a:p>
-              </p:txBody>
-            </p:sp>
-            <p:sp>
-              <p:nvSpPr>
-                <p:cNvPr id="2101" name="Text Box 53"/>
-                <p:cNvSpPr txBox="1">
-                  <a:spLocks noChangeArrowheads="1"/>
-                </p:cNvSpPr>
-                <p:nvPr/>
-              </p:nvSpPr>
-              <p:spPr bwMode="auto">
-                <a:xfrm>
-                  <a:off x="5284" y="8397"/>
-                  <a:ext cx="2688" cy="622"/>
-                </a:xfrm>
-                <a:prstGeom prst="rect">
-                  <a:avLst/>
-                </a:prstGeom>
-                <a:noFill/>
-                <a:ln w="9525">
-                  <a:noFill/>
-                  <a:round/>
-                  <a:headEnd/>
-                  <a:tailEnd/>
-                </a:ln>
-                <a:effectLst/>
-              </p:spPr>
-              <p:txBody>
-                <a:bodyPr vert="horz" wrap="square" lIns="0" tIns="0" rIns="0" bIns="0" numCol="1" anchor="t" anchorCtr="0" compatLnSpc="1">
-                  <a:prstTxWarp prst="textNoShape">
-                    <a:avLst/>
-                  </a:prstTxWarp>
-                </a:bodyPr>
-                <a:lstStyle/>
-                <a:p>
-                  <a:pPr marL="0" marR="0" lvl="0" indent="0" algn="ctr" defTabSz="914400" rtl="0" eaLnBrk="1" fontAlgn="base" latinLnBrk="0" hangingPunct="1">
-                    <a:lnSpc>
-                      <a:spcPct val="100000"/>
-                    </a:lnSpc>
-                    <a:spcBef>
-                      <a:spcPct val="0"/>
-                    </a:spcBef>
-                    <a:spcAft>
-                      <a:spcPts val="1000"/>
-                    </a:spcAft>
-                    <a:buClrTx/>
-                    <a:buSzTx/>
-                    <a:buFontTx/>
-                    <a:buNone/>
-                    <a:tabLst/>
-                  </a:pPr>
-                  <a:r>
-                    <a:rPr kumimoji="0" lang="en-CA" sz="1200" b="0" i="0" u="none" strike="noStrike" cap="none" normalizeH="0" baseline="0" smtClean="0">
-                      <a:ln>
-                        <a:noFill/>
-                      </a:ln>
-                      <a:solidFill>
-                        <a:schemeClr val="tx1"/>
-                      </a:solidFill>
-                      <a:effectLst/>
-                      <a:latin typeface="Times New Roman" pitchFamily="18" charset="0"/>
-                      <a:cs typeface="Arial" pitchFamily="34" charset="0"/>
-                    </a:rPr>
-                    <a:t>Approve Organization </a:t>
-                  </a:r>
-                </a:p>
-                <a:p>
-                  <a:pPr marL="0" marR="0" lvl="0" indent="0" algn="ctr" defTabSz="914400" rtl="0" eaLnBrk="1" fontAlgn="base" latinLnBrk="0" hangingPunct="1">
-                    <a:lnSpc>
-                      <a:spcPct val="100000"/>
-                    </a:lnSpc>
-                    <a:spcBef>
-                      <a:spcPct val="0"/>
-                    </a:spcBef>
-                    <a:spcAft>
-                      <a:spcPts val="1000"/>
-                    </a:spcAft>
-                    <a:buClrTx/>
-                    <a:buSzTx/>
-                    <a:buFontTx/>
-                    <a:buNone/>
-                    <a:tabLst/>
-                  </a:pPr>
-                  <a:r>
-                    <a:rPr kumimoji="0" lang="en-CA" sz="1200" b="0" i="0" u="none" strike="noStrike" cap="none" normalizeH="0" baseline="0" smtClean="0">
-                      <a:ln>
-                        <a:noFill/>
-                      </a:ln>
-                      <a:solidFill>
-                        <a:schemeClr val="tx1"/>
-                      </a:solidFill>
-                      <a:effectLst/>
-                      <a:latin typeface="Times New Roman" pitchFamily="18" charset="0"/>
-                      <a:cs typeface="Arial" pitchFamily="34" charset="0"/>
-                    </a:rPr>
-                    <a:t>Sign Up</a:t>
-                  </a:r>
-                  <a:endParaRPr kumimoji="0" lang="en-US" sz="1800" b="0" i="0" u="none" strike="noStrike" cap="none" normalizeH="0" baseline="0" smtClean="0">
-                    <a:ln>
-                      <a:noFill/>
-                    </a:ln>
-                    <a:solidFill>
-                      <a:schemeClr val="tx1"/>
-                    </a:solidFill>
-                    <a:effectLst/>
-                    <a:latin typeface="Arial" pitchFamily="34" charset="0"/>
-                    <a:cs typeface="Arial" pitchFamily="34" charset="0"/>
-                  </a:endParaRPr>
-                </a:p>
-              </p:txBody>
-            </p:sp>
-          </p:grpSp>
-          <p:grpSp>
-            <p:nvGrpSpPr>
-              <p:cNvPr id="2102" name="Group 54"/>
-              <p:cNvGrpSpPr>
-                <a:grpSpLocks/>
-              </p:cNvGrpSpPr>
-              <p:nvPr/>
-            </p:nvGrpSpPr>
-            <p:grpSpPr bwMode="auto">
-              <a:xfrm>
-                <a:off x="5015" y="9353"/>
-                <a:ext cx="3186" cy="941"/>
-                <a:chOff x="5015" y="9353"/>
-                <a:chExt cx="3186" cy="941"/>
-              </a:xfrm>
-            </p:grpSpPr>
-            <p:sp>
-              <p:nvSpPr>
-                <p:cNvPr id="2103" name="Oval 55"/>
-                <p:cNvSpPr>
-                  <a:spLocks noChangeArrowheads="1"/>
-                </p:cNvSpPr>
-                <p:nvPr/>
-              </p:nvSpPr>
-              <p:spPr bwMode="auto">
-                <a:xfrm>
-                  <a:off x="5015" y="9353"/>
-                  <a:ext cx="3186" cy="941"/>
-                </a:xfrm>
-                <a:prstGeom prst="ellipse">
-                  <a:avLst/>
-                </a:prstGeom>
-                <a:noFill/>
-                <a:ln w="9360">
-                  <a:solidFill>
-                    <a:srgbClr val="000000"/>
-                  </a:solidFill>
-                  <a:round/>
-                  <a:headEnd/>
-                  <a:tailEnd/>
-                </a:ln>
-                <a:effectLst/>
-              </p:spPr>
-              <p:txBody>
-                <a:bodyPr vert="horz" wrap="none" lIns="91440" tIns="45720" rIns="91440" bIns="45720" numCol="1" anchor="ctr" anchorCtr="0" compatLnSpc="1">
-                  <a:prstTxWarp prst="textNoShape">
-                    <a:avLst/>
-                  </a:prstTxWarp>
-                </a:bodyPr>
-                <a:lstStyle/>
-                <a:p>
-                  <a:endParaRPr lang="en-CA"/>
-                </a:p>
-              </p:txBody>
-            </p:sp>
-            <p:sp>
-              <p:nvSpPr>
-                <p:cNvPr id="2104" name="Text Box 56"/>
-                <p:cNvSpPr txBox="1">
-                  <a:spLocks noChangeArrowheads="1"/>
-                </p:cNvSpPr>
-                <p:nvPr/>
-              </p:nvSpPr>
-              <p:spPr bwMode="auto">
-                <a:xfrm>
-                  <a:off x="5271" y="9560"/>
-                  <a:ext cx="2687" cy="623"/>
-                </a:xfrm>
-                <a:prstGeom prst="rect">
-                  <a:avLst/>
-                </a:prstGeom>
-                <a:noFill/>
-                <a:ln w="9525">
-                  <a:noFill/>
-                  <a:round/>
-                  <a:headEnd/>
-                  <a:tailEnd/>
-                </a:ln>
-                <a:effectLst/>
-              </p:spPr>
-              <p:txBody>
-                <a:bodyPr vert="horz" wrap="square" lIns="0" tIns="0" rIns="0" bIns="0" numCol="1" anchor="t" anchorCtr="0" compatLnSpc="1">
-                  <a:prstTxWarp prst="textNoShape">
-                    <a:avLst/>
-                  </a:prstTxWarp>
-                </a:bodyPr>
-                <a:lstStyle/>
-                <a:p>
-                  <a:pPr marL="0" marR="0" lvl="0" indent="0" algn="ctr" defTabSz="914400" rtl="0" eaLnBrk="1" fontAlgn="base" latinLnBrk="0" hangingPunct="1">
-                    <a:lnSpc>
-                      <a:spcPct val="100000"/>
-                    </a:lnSpc>
-                    <a:spcBef>
-                      <a:spcPct val="0"/>
-                    </a:spcBef>
-                    <a:spcAft>
-                      <a:spcPts val="1000"/>
-                    </a:spcAft>
-                    <a:buClrTx/>
-                    <a:buSzTx/>
-                    <a:buFontTx/>
-                    <a:buNone/>
-                    <a:tabLst/>
-                  </a:pPr>
-                  <a:r>
-                    <a:rPr kumimoji="0" lang="en-CA" sz="1200" b="0" i="0" u="none" strike="noStrike" cap="none" normalizeH="0" baseline="0" smtClean="0">
-                      <a:ln>
-                        <a:noFill/>
-                      </a:ln>
-                      <a:solidFill>
-                        <a:schemeClr val="tx1"/>
-                      </a:solidFill>
-                      <a:effectLst/>
-                      <a:latin typeface="Times New Roman" pitchFamily="18" charset="0"/>
-                      <a:cs typeface="Arial" pitchFamily="34" charset="0"/>
-                    </a:rPr>
-                    <a:t>Archive Organization </a:t>
-                  </a:r>
-                </a:p>
-                <a:p>
-                  <a:pPr marL="0" marR="0" lvl="0" indent="0" algn="ctr" defTabSz="914400" rtl="0" eaLnBrk="1" fontAlgn="base" latinLnBrk="0" hangingPunct="1">
-                    <a:lnSpc>
-                      <a:spcPct val="100000"/>
-                    </a:lnSpc>
-                    <a:spcBef>
-                      <a:spcPct val="0"/>
-                    </a:spcBef>
-                    <a:spcAft>
-                      <a:spcPts val="1000"/>
-                    </a:spcAft>
-                    <a:buClrTx/>
-                    <a:buSzTx/>
-                    <a:buFontTx/>
-                    <a:buNone/>
-                    <a:tabLst/>
-                  </a:pPr>
-                  <a:r>
-                    <a:rPr kumimoji="0" lang="en-CA" sz="1200" b="0" i="0" u="none" strike="noStrike" cap="none" normalizeH="0" baseline="0" smtClean="0">
-                      <a:ln>
-                        <a:noFill/>
-                      </a:ln>
-                      <a:solidFill>
-                        <a:schemeClr val="tx1"/>
-                      </a:solidFill>
-                      <a:effectLst/>
-                      <a:latin typeface="Times New Roman" pitchFamily="18" charset="0"/>
-                      <a:cs typeface="Arial" pitchFamily="34" charset="0"/>
-                    </a:rPr>
-                    <a:t>Account (Delete)</a:t>
-                  </a:r>
-                  <a:endParaRPr kumimoji="0" lang="en-US" sz="1800" b="0" i="0" u="none" strike="noStrike" cap="none" normalizeH="0" baseline="0" smtClean="0">
-                    <a:ln>
-                      <a:noFill/>
-                    </a:ln>
-                    <a:solidFill>
-                      <a:schemeClr val="tx1"/>
-                    </a:solidFill>
-                    <a:effectLst/>
-                    <a:latin typeface="Arial" pitchFamily="34" charset="0"/>
-                    <a:cs typeface="Arial" pitchFamily="34" charset="0"/>
-                  </a:endParaRPr>
-                </a:p>
-              </p:txBody>
-            </p:sp>
-          </p:grpSp>
-          <p:grpSp>
-            <p:nvGrpSpPr>
-              <p:cNvPr id="2105" name="Group 57"/>
-              <p:cNvGrpSpPr>
-                <a:grpSpLocks/>
-              </p:cNvGrpSpPr>
-              <p:nvPr/>
-            </p:nvGrpSpPr>
-            <p:grpSpPr bwMode="auto">
-              <a:xfrm>
-                <a:off x="5100" y="10588"/>
-                <a:ext cx="3185" cy="940"/>
-                <a:chOff x="5100" y="10588"/>
-                <a:chExt cx="3185" cy="940"/>
-              </a:xfrm>
-            </p:grpSpPr>
-            <p:sp>
-              <p:nvSpPr>
-                <p:cNvPr id="2106" name="Oval 58"/>
-                <p:cNvSpPr>
-                  <a:spLocks noChangeArrowheads="1"/>
-                </p:cNvSpPr>
-                <p:nvPr/>
-              </p:nvSpPr>
-              <p:spPr bwMode="auto">
-                <a:xfrm>
-                  <a:off x="5100" y="10588"/>
-                  <a:ext cx="3185" cy="940"/>
-                </a:xfrm>
-                <a:prstGeom prst="ellipse">
-                  <a:avLst/>
-                </a:prstGeom>
-                <a:noFill/>
-                <a:ln w="9360">
-                  <a:solidFill>
-                    <a:srgbClr val="000000"/>
-                  </a:solidFill>
-                  <a:round/>
-                  <a:headEnd/>
-                  <a:tailEnd/>
-                </a:ln>
-                <a:effectLst/>
-              </p:spPr>
-              <p:txBody>
-                <a:bodyPr vert="horz" wrap="none" lIns="91440" tIns="45720" rIns="91440" bIns="45720" numCol="1" anchor="ctr" anchorCtr="0" compatLnSpc="1">
-                  <a:prstTxWarp prst="textNoShape">
-                    <a:avLst/>
-                  </a:prstTxWarp>
-                </a:bodyPr>
-                <a:lstStyle/>
-                <a:p>
-                  <a:endParaRPr lang="en-CA"/>
-                </a:p>
-              </p:txBody>
-            </p:sp>
-            <p:sp>
-              <p:nvSpPr>
-                <p:cNvPr id="2107" name="Text Box 59"/>
-                <p:cNvSpPr txBox="1">
-                  <a:spLocks noChangeArrowheads="1"/>
-                </p:cNvSpPr>
-                <p:nvPr/>
-              </p:nvSpPr>
-              <p:spPr bwMode="auto">
-                <a:xfrm>
-                  <a:off x="5356" y="10795"/>
-                  <a:ext cx="2687" cy="623"/>
-                </a:xfrm>
-                <a:prstGeom prst="rect">
-                  <a:avLst/>
-                </a:prstGeom>
-                <a:noFill/>
-                <a:ln w="9525">
-                  <a:noFill/>
-                  <a:round/>
-                  <a:headEnd/>
-                  <a:tailEnd/>
-                </a:ln>
-                <a:effectLst/>
-              </p:spPr>
-              <p:txBody>
-                <a:bodyPr vert="horz" wrap="square" lIns="0" tIns="0" rIns="0" bIns="0" numCol="1" anchor="t" anchorCtr="0" compatLnSpc="1">
-                  <a:prstTxWarp prst="textNoShape">
-                    <a:avLst/>
-                  </a:prstTxWarp>
-                </a:bodyPr>
-                <a:lstStyle/>
-                <a:p>
-                  <a:pPr marL="0" marR="0" lvl="0" indent="0" algn="ctr" defTabSz="914400" rtl="0" eaLnBrk="1" fontAlgn="base" latinLnBrk="0" hangingPunct="1">
-                    <a:lnSpc>
-                      <a:spcPct val="100000"/>
-                    </a:lnSpc>
-                    <a:spcBef>
-                      <a:spcPct val="0"/>
-                    </a:spcBef>
-                    <a:spcAft>
-                      <a:spcPts val="1000"/>
-                    </a:spcAft>
-                    <a:buClrTx/>
-                    <a:buSzTx/>
-                    <a:buFontTx/>
-                    <a:buNone/>
-                    <a:tabLst/>
-                  </a:pPr>
-                  <a:r>
-                    <a:rPr kumimoji="0" lang="en-CA" sz="1200" b="0" i="0" u="none" strike="noStrike" cap="none" normalizeH="0" baseline="0" smtClean="0">
-                      <a:ln>
-                        <a:noFill/>
-                      </a:ln>
-                      <a:solidFill>
-                        <a:schemeClr val="tx1"/>
-                      </a:solidFill>
-                      <a:effectLst/>
-                      <a:latin typeface="Times New Roman" pitchFamily="18" charset="0"/>
-                      <a:cs typeface="Arial" pitchFamily="34" charset="0"/>
-                    </a:rPr>
-                    <a:t>Archive Volunteer </a:t>
-                  </a:r>
-                </a:p>
-                <a:p>
-                  <a:pPr marL="0" marR="0" lvl="0" indent="0" algn="ctr" defTabSz="914400" rtl="0" eaLnBrk="1" fontAlgn="base" latinLnBrk="0" hangingPunct="1">
-                    <a:lnSpc>
-                      <a:spcPct val="100000"/>
-                    </a:lnSpc>
-                    <a:spcBef>
-                      <a:spcPct val="0"/>
-                    </a:spcBef>
-                    <a:spcAft>
-                      <a:spcPts val="1000"/>
-                    </a:spcAft>
-                    <a:buClrTx/>
-                    <a:buSzTx/>
-                    <a:buFontTx/>
-                    <a:buNone/>
-                    <a:tabLst/>
-                  </a:pPr>
-                  <a:r>
-                    <a:rPr kumimoji="0" lang="en-CA" sz="1200" b="0" i="0" u="none" strike="noStrike" cap="none" normalizeH="0" baseline="0" smtClean="0">
-                      <a:ln>
-                        <a:noFill/>
-                      </a:ln>
-                      <a:solidFill>
-                        <a:schemeClr val="tx1"/>
-                      </a:solidFill>
-                      <a:effectLst/>
-                      <a:latin typeface="Times New Roman" pitchFamily="18" charset="0"/>
-                      <a:cs typeface="Arial" pitchFamily="34" charset="0"/>
-                    </a:rPr>
-                    <a:t>Account (Delete)</a:t>
-                  </a:r>
-                  <a:endParaRPr kumimoji="0" lang="en-US" sz="1800" b="0" i="0" u="none" strike="noStrike" cap="none" normalizeH="0" baseline="0" smtClean="0">
-                    <a:ln>
-                      <a:noFill/>
-                    </a:ln>
-                    <a:solidFill>
-                      <a:schemeClr val="tx1"/>
-                    </a:solidFill>
-                    <a:effectLst/>
-                    <a:latin typeface="Arial" pitchFamily="34" charset="0"/>
-                    <a:cs typeface="Arial" pitchFamily="34" charset="0"/>
-                  </a:endParaRPr>
-                </a:p>
-              </p:txBody>
-            </p:sp>
-          </p:grpSp>
-          <p:sp>
-            <p:nvSpPr>
-              <p:cNvPr id="2108" name="Line 60"/>
-              <p:cNvSpPr>
-                <a:spLocks noChangeShapeType="1"/>
-              </p:cNvSpPr>
-              <p:nvPr/>
-            </p:nvSpPr>
-            <p:spPr bwMode="auto">
-              <a:xfrm flipV="1">
-                <a:off x="3064" y="1154"/>
-                <a:ext cx="1969" cy="397"/>
-              </a:xfrm>
-              <a:prstGeom prst="line">
-                <a:avLst/>
-              </a:prstGeom>
-              <a:noFill/>
-              <a:ln w="9360">
-                <a:solidFill>
-                  <a:srgbClr val="000000"/>
-                </a:solidFill>
-                <a:round/>
-                <a:headEnd/>
-                <a:tailEnd/>
-              </a:ln>
-              <a:effectLst/>
-            </p:spPr>
-            <p:txBody>
-              <a:bodyPr vert="horz" wrap="square" lIns="91440" tIns="45720" rIns="91440" bIns="45720" numCol="1" anchor="t" anchorCtr="0" compatLnSpc="1">
-                <a:prstTxWarp prst="textNoShape">
-                  <a:avLst/>
-                </a:prstTxWarp>
-              </a:bodyPr>
-              <a:lstStyle/>
-              <a:p>
-                <a:endParaRPr lang="en-CA"/>
-              </a:p>
-            </p:txBody>
-          </p:sp>
-          <p:sp>
-            <p:nvSpPr>
-              <p:cNvPr id="2109" name="Line 61"/>
-              <p:cNvSpPr>
-                <a:spLocks noChangeShapeType="1"/>
-              </p:cNvSpPr>
-              <p:nvPr/>
-            </p:nvSpPr>
-            <p:spPr bwMode="auto">
-              <a:xfrm flipH="1" flipV="1">
-                <a:off x="3064" y="1552"/>
-                <a:ext cx="2004" cy="466"/>
-              </a:xfrm>
-              <a:prstGeom prst="line">
-                <a:avLst/>
-              </a:prstGeom>
-              <a:noFill/>
-              <a:ln w="9360">
-                <a:solidFill>
-                  <a:srgbClr val="000000"/>
-                </a:solidFill>
-                <a:round/>
-                <a:headEnd/>
-                <a:tailEnd/>
-              </a:ln>
-              <a:effectLst/>
-            </p:spPr>
-            <p:txBody>
-              <a:bodyPr vert="horz" wrap="square" lIns="91440" tIns="45720" rIns="91440" bIns="45720" numCol="1" anchor="t" anchorCtr="0" compatLnSpc="1">
-                <a:prstTxWarp prst="textNoShape">
-                  <a:avLst/>
-                </a:prstTxWarp>
-              </a:bodyPr>
-              <a:lstStyle/>
-              <a:p>
-                <a:endParaRPr lang="en-CA"/>
-              </a:p>
-            </p:txBody>
-          </p:sp>
-          <p:sp>
-            <p:nvSpPr>
-              <p:cNvPr id="2110" name="Line 62"/>
-              <p:cNvSpPr>
-                <a:spLocks noChangeShapeType="1"/>
-              </p:cNvSpPr>
-              <p:nvPr/>
-            </p:nvSpPr>
-            <p:spPr bwMode="auto">
-              <a:xfrm>
-                <a:off x="3064" y="1552"/>
-                <a:ext cx="1976" cy="1302"/>
-              </a:xfrm>
-              <a:prstGeom prst="line">
-                <a:avLst/>
-              </a:prstGeom>
-              <a:noFill/>
-              <a:ln w="9360">
-                <a:solidFill>
-                  <a:srgbClr val="000000"/>
-                </a:solidFill>
-                <a:round/>
-                <a:headEnd/>
-                <a:tailEnd/>
-              </a:ln>
-              <a:effectLst/>
-            </p:spPr>
-            <p:txBody>
-              <a:bodyPr vert="horz" wrap="square" lIns="91440" tIns="45720" rIns="91440" bIns="45720" numCol="1" anchor="t" anchorCtr="0" compatLnSpc="1">
-                <a:prstTxWarp prst="textNoShape">
-                  <a:avLst/>
-                </a:prstTxWarp>
-              </a:bodyPr>
-              <a:lstStyle/>
-              <a:p>
-                <a:endParaRPr lang="en-CA"/>
-              </a:p>
-            </p:txBody>
-          </p:sp>
-          <p:sp>
-            <p:nvSpPr>
-              <p:cNvPr id="2111" name="Line 63"/>
-              <p:cNvSpPr>
-                <a:spLocks noChangeShapeType="1"/>
-              </p:cNvSpPr>
-              <p:nvPr/>
-            </p:nvSpPr>
-            <p:spPr bwMode="auto">
-              <a:xfrm>
-                <a:off x="3064" y="1552"/>
-                <a:ext cx="2040" cy="2213"/>
-              </a:xfrm>
-              <a:prstGeom prst="line">
-                <a:avLst/>
-              </a:prstGeom>
-              <a:noFill/>
-              <a:ln w="9360">
-                <a:solidFill>
-                  <a:srgbClr val="000000"/>
-                </a:solidFill>
-                <a:round/>
-                <a:headEnd/>
-                <a:tailEnd/>
-              </a:ln>
-              <a:effectLst/>
-            </p:spPr>
-            <p:txBody>
-              <a:bodyPr vert="horz" wrap="square" lIns="91440" tIns="45720" rIns="91440" bIns="45720" numCol="1" anchor="t" anchorCtr="0" compatLnSpc="1">
-                <a:prstTxWarp prst="textNoShape">
-                  <a:avLst/>
-                </a:prstTxWarp>
-              </a:bodyPr>
-              <a:lstStyle/>
-              <a:p>
-                <a:endParaRPr lang="en-CA"/>
-              </a:p>
-            </p:txBody>
-          </p:sp>
-          <p:sp>
-            <p:nvSpPr>
-              <p:cNvPr id="2112" name="Line 64"/>
-              <p:cNvSpPr>
-                <a:spLocks noChangeShapeType="1"/>
-              </p:cNvSpPr>
-              <p:nvPr/>
-            </p:nvSpPr>
-            <p:spPr bwMode="auto">
-              <a:xfrm flipH="1">
-                <a:off x="2986" y="5248"/>
-                <a:ext cx="2062" cy="555"/>
-              </a:xfrm>
-              <a:prstGeom prst="line">
-                <a:avLst/>
-              </a:prstGeom>
-              <a:noFill/>
-              <a:ln w="9360">
-                <a:solidFill>
-                  <a:srgbClr val="000000"/>
-                </a:solidFill>
-                <a:round/>
-                <a:headEnd/>
-                <a:tailEnd/>
-              </a:ln>
-              <a:effectLst/>
-            </p:spPr>
-            <p:txBody>
-              <a:bodyPr vert="horz" wrap="square" lIns="91440" tIns="45720" rIns="91440" bIns="45720" numCol="1" anchor="t" anchorCtr="0" compatLnSpc="1">
-                <a:prstTxWarp prst="textNoShape">
-                  <a:avLst/>
-                </a:prstTxWarp>
-              </a:bodyPr>
-              <a:lstStyle/>
-              <a:p>
-                <a:endParaRPr lang="en-CA"/>
-              </a:p>
-            </p:txBody>
-          </p:sp>
-          <p:sp>
-            <p:nvSpPr>
-              <p:cNvPr id="2113" name="Line 65"/>
-              <p:cNvSpPr>
-                <a:spLocks noChangeShapeType="1"/>
-              </p:cNvSpPr>
-              <p:nvPr/>
-            </p:nvSpPr>
-            <p:spPr bwMode="auto">
-              <a:xfrm flipH="1" flipV="1">
-                <a:off x="2985" y="5804"/>
-                <a:ext cx="2048" cy="467"/>
-              </a:xfrm>
-              <a:prstGeom prst="line">
-                <a:avLst/>
-              </a:prstGeom>
-              <a:noFill/>
-              <a:ln w="9360">
-                <a:solidFill>
-                  <a:srgbClr val="000000"/>
-                </a:solidFill>
-                <a:round/>
-                <a:headEnd/>
-                <a:tailEnd/>
-              </a:ln>
-              <a:effectLst/>
-            </p:spPr>
-            <p:txBody>
-              <a:bodyPr vert="horz" wrap="square" lIns="91440" tIns="45720" rIns="91440" bIns="45720" numCol="1" anchor="t" anchorCtr="0" compatLnSpc="1">
-                <a:prstTxWarp prst="textNoShape">
-                  <a:avLst/>
-                </a:prstTxWarp>
-              </a:bodyPr>
-              <a:lstStyle/>
-              <a:p>
-                <a:endParaRPr lang="en-CA"/>
-              </a:p>
-            </p:txBody>
-          </p:sp>
-          <p:sp>
-            <p:nvSpPr>
-              <p:cNvPr id="2114" name="Line 66"/>
-              <p:cNvSpPr>
-                <a:spLocks noChangeShapeType="1"/>
-              </p:cNvSpPr>
-              <p:nvPr/>
-            </p:nvSpPr>
-            <p:spPr bwMode="auto">
-              <a:xfrm flipH="1" flipV="1">
-                <a:off x="2985" y="5804"/>
-                <a:ext cx="2034" cy="1510"/>
-              </a:xfrm>
-              <a:prstGeom prst="line">
-                <a:avLst/>
-              </a:prstGeom>
-              <a:noFill/>
-              <a:ln w="9360">
-                <a:solidFill>
-                  <a:srgbClr val="000000"/>
-                </a:solidFill>
-                <a:round/>
-                <a:headEnd/>
-                <a:tailEnd/>
-              </a:ln>
-              <a:effectLst/>
-            </p:spPr>
-            <p:txBody>
-              <a:bodyPr vert="horz" wrap="square" lIns="91440" tIns="45720" rIns="91440" bIns="45720" numCol="1" anchor="t" anchorCtr="0" compatLnSpc="1">
-                <a:prstTxWarp prst="textNoShape">
-                  <a:avLst/>
-                </a:prstTxWarp>
-              </a:bodyPr>
-              <a:lstStyle/>
-              <a:p>
-                <a:endParaRPr lang="en-CA"/>
-              </a:p>
-            </p:txBody>
-          </p:sp>
-          <p:sp>
-            <p:nvSpPr>
-              <p:cNvPr id="2115" name="Line 67"/>
-              <p:cNvSpPr>
-                <a:spLocks noChangeShapeType="1"/>
-              </p:cNvSpPr>
-              <p:nvPr/>
-            </p:nvSpPr>
-            <p:spPr bwMode="auto">
-              <a:xfrm flipH="1">
-                <a:off x="2853" y="8697"/>
-                <a:ext cx="2173" cy="739"/>
-              </a:xfrm>
-              <a:prstGeom prst="line">
-                <a:avLst/>
-              </a:prstGeom>
-              <a:noFill/>
-              <a:ln w="9360">
-                <a:solidFill>
-                  <a:srgbClr val="000000"/>
-                </a:solidFill>
-                <a:round/>
-                <a:headEnd/>
-                <a:tailEnd/>
-              </a:ln>
-              <a:effectLst/>
-            </p:spPr>
-            <p:txBody>
-              <a:bodyPr vert="horz" wrap="square" lIns="91440" tIns="45720" rIns="91440" bIns="45720" numCol="1" anchor="t" anchorCtr="0" compatLnSpc="1">
-                <a:prstTxWarp prst="textNoShape">
-                  <a:avLst/>
-                </a:prstTxWarp>
-              </a:bodyPr>
-              <a:lstStyle/>
-              <a:p>
-                <a:endParaRPr lang="en-CA"/>
-              </a:p>
-            </p:txBody>
-          </p:sp>
-          <p:sp>
-            <p:nvSpPr>
-              <p:cNvPr id="2116" name="Line 68"/>
-              <p:cNvSpPr>
-                <a:spLocks noChangeShapeType="1"/>
-              </p:cNvSpPr>
-              <p:nvPr/>
-            </p:nvSpPr>
-            <p:spPr bwMode="auto">
-              <a:xfrm flipH="1" flipV="1">
-                <a:off x="2852" y="9438"/>
-                <a:ext cx="2160" cy="389"/>
-              </a:xfrm>
-              <a:prstGeom prst="line">
-                <a:avLst/>
-              </a:prstGeom>
-              <a:noFill/>
-              <a:ln w="9360">
-                <a:solidFill>
-                  <a:srgbClr val="000000"/>
-                </a:solidFill>
-                <a:round/>
-                <a:headEnd/>
-                <a:tailEnd/>
-              </a:ln>
-              <a:effectLst/>
-            </p:spPr>
-            <p:txBody>
-              <a:bodyPr vert="horz" wrap="square" lIns="91440" tIns="45720" rIns="91440" bIns="45720" numCol="1" anchor="t" anchorCtr="0" compatLnSpc="1">
-                <a:prstTxWarp prst="textNoShape">
-                  <a:avLst/>
-                </a:prstTxWarp>
-              </a:bodyPr>
-              <a:lstStyle/>
-              <a:p>
-                <a:endParaRPr lang="en-CA"/>
-              </a:p>
-            </p:txBody>
-          </p:sp>
-          <p:sp>
-            <p:nvSpPr>
-              <p:cNvPr id="2117" name="Line 69"/>
-              <p:cNvSpPr>
-                <a:spLocks noChangeShapeType="1"/>
-              </p:cNvSpPr>
-              <p:nvPr/>
-            </p:nvSpPr>
-            <p:spPr bwMode="auto">
-              <a:xfrm flipH="1" flipV="1">
-                <a:off x="2853" y="9437"/>
-                <a:ext cx="2244" cy="1596"/>
-              </a:xfrm>
-              <a:prstGeom prst="line">
-                <a:avLst/>
-              </a:prstGeom>
-              <a:noFill/>
-              <a:ln w="9360">
-                <a:solidFill>
-                  <a:srgbClr val="000000"/>
-                </a:solidFill>
-                <a:round/>
-                <a:headEnd/>
-                <a:tailEnd/>
-              </a:ln>
-              <a:effectLst/>
-            </p:spPr>
-            <p:txBody>
-              <a:bodyPr vert="horz" wrap="square" lIns="91440" tIns="45720" rIns="91440" bIns="45720" numCol="1" anchor="t" anchorCtr="0" compatLnSpc="1">
-                <a:prstTxWarp prst="textNoShape">
-                  <a:avLst/>
-                </a:prstTxWarp>
-              </a:bodyPr>
-              <a:lstStyle/>
-              <a:p>
-                <a:endParaRPr lang="en-CA"/>
-              </a:p>
-            </p:txBody>
-          </p:sp>
-        </p:grpSp>
-        <p:sp>
-          <p:nvSpPr>
-            <p:cNvPr id="2118" name="Text Box 70"/>
-            <p:cNvSpPr txBox="1">
-              <a:spLocks noChangeArrowheads="1"/>
-            </p:cNvSpPr>
-            <p:nvPr/>
-          </p:nvSpPr>
-          <p:spPr bwMode="auto">
-            <a:xfrm>
-              <a:off x="4936" y="260"/>
-              <a:ext cx="3232" cy="415"/>
-            </a:xfrm>
-            <a:prstGeom prst="rect">
-              <a:avLst/>
-            </a:prstGeom>
-            <a:noFill/>
-            <a:ln w="9525">
-              <a:noFill/>
-              <a:round/>
-              <a:headEnd/>
-              <a:tailEnd/>
-            </a:ln>
-            <a:effectLst/>
-          </p:spPr>
-          <p:txBody>
-            <a:bodyPr vert="horz" wrap="square" lIns="0" tIns="0" rIns="0" bIns="0" numCol="1" anchor="t" anchorCtr="0" compatLnSpc="1">
-              <a:prstTxWarp prst="textNoShape">
-                <a:avLst/>
-              </a:prstTxWarp>
-            </a:bodyPr>
-            <a:lstStyle/>
-            <a:p>
-              <a:pPr marL="0" marR="0" lvl="0" indent="0" algn="ctr" defTabSz="914400" rtl="0" eaLnBrk="1" fontAlgn="base" latinLnBrk="0" hangingPunct="1">
-                <a:lnSpc>
-                  <a:spcPct val="100000"/>
-                </a:lnSpc>
-                <a:spcBef>
-                  <a:spcPct val="0"/>
-                </a:spcBef>
-                <a:spcAft>
-                  <a:spcPts val="1000"/>
-                </a:spcAft>
-                <a:buClrTx/>
-                <a:buSzTx/>
-                <a:buFontTx/>
-                <a:buNone/>
-                <a:tabLst/>
-              </a:pPr>
-              <a:r>
-                <a:rPr kumimoji="0" lang="en-CA" sz="1100" b="0" i="0" u="sng" strike="noStrike" cap="none" normalizeH="0" baseline="0" smtClean="0">
-                  <a:ln>
-                    <a:noFill/>
-                  </a:ln>
-                  <a:solidFill>
-                    <a:schemeClr val="tx1"/>
-                  </a:solidFill>
-                  <a:effectLst/>
-                  <a:latin typeface="Calibri" pitchFamily="34" charset="0"/>
-                  <a:cs typeface="Arial" pitchFamily="34" charset="0"/>
-                </a:rPr>
-                <a:t>iVolunteer Website</a:t>
-              </a:r>
-              <a:endParaRPr kumimoji="0" lang="en-US" sz="1800" b="0" i="0" u="none" strike="noStrike" cap="none" normalizeH="0" baseline="0" smtClean="0">
-                <a:ln>
-                  <a:noFill/>
-                </a:ln>
-                <a:solidFill>
-                  <a:schemeClr val="tx1"/>
-                </a:solidFill>
-                <a:effectLst/>
-                <a:latin typeface="Arial" pitchFamily="34" charset="0"/>
-                <a:cs typeface="Arial" pitchFamily="34" charset="0"/>
-              </a:endParaRPr>
-            </a:p>
-          </p:txBody>
-        </p:sp>
-      </p:grpSp>
+            <a:miter lim="800000"/>
+            <a:headEnd/>
+            <a:tailEnd/>
+          </a:ln>
+        </p:spPr>
+      </p:pic>
     </p:spTree>
   </p:cSld>
   <p:clrMapOvr>
@@ -7057,6 +4212,13 @@
   <p:clrMapOvr>
     <a:masterClrMapping/>
   </p:clrMapOvr>
+  <p:timing>
+    <p:tnLst>
+      <p:par>
+        <p:cTn id="1" dur="indefinite" restart="never" nodeType="tmRoot"/>
+      </p:par>
+    </p:tnLst>
+  </p:timing>
 </p:sld>
 </file>
 
@@ -7186,6 +4348,13 @@
   <p:clrMapOvr>
     <a:masterClrMapping/>
   </p:clrMapOvr>
+  <p:timing>
+    <p:tnLst>
+      <p:par>
+        <p:cTn id="1" dur="indefinite" restart="never" nodeType="tmRoot"/>
+      </p:par>
+    </p:tnLst>
+  </p:timing>
 </p:sld>
 </file>
 
@@ -7254,13 +4423,8 @@
             <a:pPr lvl="0"/>
             <a:r>
               <a:rPr lang="en-CA" dirty="0" smtClean="0"/>
-              <a:t>Visual site design: 20 </a:t>
-            </a:r>
-            <a:r>
-              <a:rPr lang="en-CA" dirty="0" smtClean="0"/>
-              <a:t>hours</a:t>
-            </a:r>
-            <a:endParaRPr lang="en-CA" dirty="0" smtClean="0"/>
+              <a:t>Visual site design: 20 hours</a:t>
+            </a:r>
           </a:p>
           <a:p>
             <a:pPr lvl="0"/>
@@ -7273,11 +4437,7 @@
             <a:pPr lvl="0"/>
             <a:r>
               <a:rPr lang="en-CA" dirty="0" smtClean="0"/>
-              <a:t>Documentation: 18 </a:t>
-            </a:r>
-            <a:r>
-              <a:rPr lang="en-CA" dirty="0" smtClean="0"/>
-              <a:t>hours</a:t>
+              <a:t>Documentation: 18 hours</a:t>
             </a:r>
           </a:p>
           <a:p>
@@ -7295,15 +4455,7 @@
             <a:pPr lvl="0"/>
             <a:r>
               <a:rPr lang="en-CA" dirty="0" smtClean="0"/>
-              <a:t>DB of postings, accounts</a:t>
-            </a:r>
-            <a:r>
-              <a:rPr lang="en-CA" dirty="0" smtClean="0"/>
-              <a:t> </a:t>
-            </a:r>
-            <a:r>
-              <a:rPr lang="en-CA" dirty="0" smtClean="0"/>
-              <a:t>and schedules</a:t>
+              <a:t>DB of postings, accounts and schedules</a:t>
             </a:r>
           </a:p>
           <a:p>
@@ -7319,7 +4471,6 @@
               <a:rPr lang="en-CA" dirty="0" smtClean="0"/>
               <a:t>Project documentation</a:t>
             </a:r>
-            <a:endParaRPr lang="en-CA" dirty="0" smtClean="0"/>
           </a:p>
           <a:p>
             <a:pPr lvl="0"/>

</xml_diff>